<commit_message>
Added final examples to final version
</commit_message>
<xml_diff>
--- a/Introduction to Linux.pptx
+++ b/Introduction to Linux.pptx
@@ -4887,7 +4887,7 @@
   <p:cSld>
     <p:spTree>
       <p:nvGrpSpPr>
-        <p:cNvPr id="401" name="Shape 401"/>
+        <p:cNvPr id="402" name="Shape 402"/>
         <p:cNvGrpSpPr/>
         <p:nvPr/>
       </p:nvGrpSpPr>
@@ -4901,7 +4901,7 @@
       </p:grpSpPr>
       <p:sp>
         <p:nvSpPr>
-          <p:cNvPr id="402" name="Google Shape;402;g500589c4d0_0_39:notes"/>
+          <p:cNvPr id="403" name="Google Shape;403;g500589c4d0_0_39:notes"/>
           <p:cNvSpPr/>
           <p:nvPr>
             <p:ph idx="2" type="sldImg"/>
@@ -4936,7 +4936,7 @@
       </p:sp>
       <p:sp>
         <p:nvSpPr>
-          <p:cNvPr id="403" name="Google Shape;403;g500589c4d0_0_39:notes"/>
+          <p:cNvPr id="404" name="Google Shape;404;g500589c4d0_0_39:notes"/>
           <p:cNvSpPr txBox="1"/>
           <p:nvPr>
             <p:ph idx="1" type="body"/>
@@ -4986,7 +4986,7 @@
   <p:cSld>
     <p:spTree>
       <p:nvGrpSpPr>
-        <p:cNvPr id="407" name="Shape 407"/>
+        <p:cNvPr id="408" name="Shape 408"/>
         <p:cNvGrpSpPr/>
         <p:nvPr/>
       </p:nvGrpSpPr>
@@ -5000,7 +5000,7 @@
       </p:grpSpPr>
       <p:sp>
         <p:nvSpPr>
-          <p:cNvPr id="408" name="Google Shape;408;g51bd0dfde3_0_54:notes"/>
+          <p:cNvPr id="409" name="Google Shape;409;g51bd0dfde3_0_54:notes"/>
           <p:cNvSpPr/>
           <p:nvPr>
             <p:ph idx="2" type="sldImg"/>
@@ -5035,7 +5035,7 @@
       </p:sp>
       <p:sp>
         <p:nvSpPr>
-          <p:cNvPr id="409" name="Google Shape;409;g51bd0dfde3_0_54:notes"/>
+          <p:cNvPr id="410" name="Google Shape;410;g51bd0dfde3_0_54:notes"/>
           <p:cNvSpPr txBox="1"/>
           <p:nvPr>
             <p:ph idx="1" type="body"/>
@@ -5184,7 +5184,7 @@
   <p:cSld>
     <p:spTree>
       <p:nvGrpSpPr>
-        <p:cNvPr id="413" name="Shape 413"/>
+        <p:cNvPr id="414" name="Shape 414"/>
         <p:cNvGrpSpPr/>
         <p:nvPr/>
       </p:nvGrpSpPr>
@@ -5198,7 +5198,7 @@
       </p:grpSpPr>
       <p:sp>
         <p:nvSpPr>
-          <p:cNvPr id="414" name="Google Shape;414;g51bd0dfde3_0_60:notes"/>
+          <p:cNvPr id="415" name="Google Shape;415;g51bd0dfde3_0_60:notes"/>
           <p:cNvSpPr/>
           <p:nvPr>
             <p:ph idx="2" type="sldImg"/>
@@ -5233,7 +5233,7 @@
       </p:sp>
       <p:sp>
         <p:nvSpPr>
-          <p:cNvPr id="415" name="Google Shape;415;g51bd0dfde3_0_60:notes"/>
+          <p:cNvPr id="416" name="Google Shape;416;g51bd0dfde3_0_60:notes"/>
           <p:cNvSpPr txBox="1"/>
           <p:nvPr>
             <p:ph idx="1" type="body"/>
@@ -5283,7 +5283,7 @@
   <p:cSld>
     <p:spTree>
       <p:nvGrpSpPr>
-        <p:cNvPr id="430" name="Shape 430"/>
+        <p:cNvPr id="431" name="Shape 431"/>
         <p:cNvGrpSpPr/>
         <p:nvPr/>
       </p:nvGrpSpPr>
@@ -5297,7 +5297,7 @@
       </p:grpSpPr>
       <p:sp>
         <p:nvSpPr>
-          <p:cNvPr id="431" name="Google Shape;431;g51bd0dfde3_0_84:notes"/>
+          <p:cNvPr id="432" name="Google Shape;432;g51bd0dfde3_0_84:notes"/>
           <p:cNvSpPr/>
           <p:nvPr>
             <p:ph idx="2" type="sldImg"/>
@@ -5332,7 +5332,7 @@
       </p:sp>
       <p:sp>
         <p:nvSpPr>
-          <p:cNvPr id="432" name="Google Shape;432;g51bd0dfde3_0_84:notes"/>
+          <p:cNvPr id="433" name="Google Shape;433;g51bd0dfde3_0_84:notes"/>
           <p:cNvSpPr txBox="1"/>
           <p:nvPr>
             <p:ph idx="1" type="body"/>
@@ -5382,7 +5382,7 @@
   <p:cSld>
     <p:spTree>
       <p:nvGrpSpPr>
-        <p:cNvPr id="436" name="Shape 436"/>
+        <p:cNvPr id="437" name="Shape 437"/>
         <p:cNvGrpSpPr/>
         <p:nvPr/>
       </p:nvGrpSpPr>
@@ -5396,7 +5396,7 @@
       </p:grpSpPr>
       <p:sp>
         <p:nvSpPr>
-          <p:cNvPr id="437" name="Google Shape;437;g51bd0dfde3_0_89:notes"/>
+          <p:cNvPr id="438" name="Google Shape;438;g51bd0dfde3_0_89:notes"/>
           <p:cNvSpPr/>
           <p:nvPr>
             <p:ph idx="2" type="sldImg"/>
@@ -5431,7 +5431,7 @@
       </p:sp>
       <p:sp>
         <p:nvSpPr>
-          <p:cNvPr id="438" name="Google Shape;438;g51bd0dfde3_0_89:notes"/>
+          <p:cNvPr id="439" name="Google Shape;439;g51bd0dfde3_0_89:notes"/>
           <p:cNvSpPr txBox="1"/>
           <p:nvPr>
             <p:ph idx="1" type="body"/>
@@ -5481,7 +5481,7 @@
   <p:cSld>
     <p:spTree>
       <p:nvGrpSpPr>
-        <p:cNvPr id="442" name="Shape 442"/>
+        <p:cNvPr id="443" name="Shape 443"/>
         <p:cNvGrpSpPr/>
         <p:nvPr/>
       </p:nvGrpSpPr>
@@ -5495,7 +5495,7 @@
       </p:grpSpPr>
       <p:sp>
         <p:nvSpPr>
-          <p:cNvPr id="443" name="Google Shape;443;g51bd0dfde3_0_99:notes"/>
+          <p:cNvPr id="444" name="Google Shape;444;g51bd0dfde3_0_99:notes"/>
           <p:cNvSpPr/>
           <p:nvPr>
             <p:ph idx="2" type="sldImg"/>
@@ -5530,7 +5530,7 @@
       </p:sp>
       <p:sp>
         <p:nvSpPr>
-          <p:cNvPr id="444" name="Google Shape;444;g51bd0dfde3_0_99:notes"/>
+          <p:cNvPr id="445" name="Google Shape;445;g51bd0dfde3_0_99:notes"/>
           <p:cNvSpPr txBox="1"/>
           <p:nvPr>
             <p:ph idx="1" type="body"/>
@@ -5580,7 +5580,7 @@
   <p:cSld>
     <p:spTree>
       <p:nvGrpSpPr>
-        <p:cNvPr id="448" name="Shape 448"/>
+        <p:cNvPr id="449" name="Shape 449"/>
         <p:cNvGrpSpPr/>
         <p:nvPr/>
       </p:nvGrpSpPr>
@@ -5594,7 +5594,7 @@
       </p:grpSpPr>
       <p:sp>
         <p:nvSpPr>
-          <p:cNvPr id="449" name="Google Shape;449;g51bd0dfde3_0_18:notes"/>
+          <p:cNvPr id="450" name="Google Shape;450;g51bd0dfde3_0_18:notes"/>
           <p:cNvSpPr/>
           <p:nvPr>
             <p:ph idx="2" type="sldImg"/>
@@ -5629,7 +5629,7 @@
       </p:sp>
       <p:sp>
         <p:nvSpPr>
-          <p:cNvPr id="450" name="Google Shape;450;g51bd0dfde3_0_18:notes"/>
+          <p:cNvPr id="451" name="Google Shape;451;g51bd0dfde3_0_18:notes"/>
           <p:cNvSpPr txBox="1"/>
           <p:nvPr>
             <p:ph idx="1" type="body"/>
@@ -5679,7 +5679,7 @@
   <p:cSld>
     <p:spTree>
       <p:nvGrpSpPr>
-        <p:cNvPr id="454" name="Shape 454"/>
+        <p:cNvPr id="455" name="Shape 455"/>
         <p:cNvGrpSpPr/>
         <p:nvPr/>
       </p:nvGrpSpPr>
@@ -5693,7 +5693,7 @@
       </p:grpSpPr>
       <p:sp>
         <p:nvSpPr>
-          <p:cNvPr id="455" name="Google Shape;455;g51f3d6bdf7_0_56:notes"/>
+          <p:cNvPr id="456" name="Google Shape;456;g51f3d6bdf7_0_56:notes"/>
           <p:cNvSpPr/>
           <p:nvPr>
             <p:ph idx="2" type="sldImg"/>
@@ -5728,7 +5728,7 @@
       </p:sp>
       <p:sp>
         <p:nvSpPr>
-          <p:cNvPr id="456" name="Google Shape;456;g51f3d6bdf7_0_56:notes"/>
+          <p:cNvPr id="457" name="Google Shape;457;g51f3d6bdf7_0_56:notes"/>
           <p:cNvSpPr txBox="1"/>
           <p:nvPr>
             <p:ph idx="1" type="body"/>
@@ -5778,7 +5778,7 @@
   <p:cSld>
     <p:spTree>
       <p:nvGrpSpPr>
-        <p:cNvPr id="460" name="Shape 460"/>
+        <p:cNvPr id="461" name="Shape 461"/>
         <p:cNvGrpSpPr/>
         <p:nvPr/>
       </p:nvGrpSpPr>
@@ -5792,7 +5792,7 @@
       </p:grpSpPr>
       <p:sp>
         <p:nvSpPr>
-          <p:cNvPr id="461" name="Google Shape;461;g51bd0dfde3_0_23:notes"/>
+          <p:cNvPr id="462" name="Google Shape;462;g51bd0dfde3_0_23:notes"/>
           <p:cNvSpPr/>
           <p:nvPr>
             <p:ph idx="2" type="sldImg"/>
@@ -5827,7 +5827,7 @@
       </p:sp>
       <p:sp>
         <p:nvSpPr>
-          <p:cNvPr id="462" name="Google Shape;462;g51bd0dfde3_0_23:notes"/>
+          <p:cNvPr id="463" name="Google Shape;463;g51bd0dfde3_0_23:notes"/>
           <p:cNvSpPr txBox="1"/>
           <p:nvPr>
             <p:ph idx="1" type="body"/>
@@ -5877,7 +5877,7 @@
   <p:cSld>
     <p:spTree>
       <p:nvGrpSpPr>
-        <p:cNvPr id="468" name="Shape 468"/>
+        <p:cNvPr id="469" name="Shape 469"/>
         <p:cNvGrpSpPr/>
         <p:nvPr/>
       </p:nvGrpSpPr>
@@ -5891,7 +5891,7 @@
       </p:grpSpPr>
       <p:sp>
         <p:nvSpPr>
-          <p:cNvPr id="469" name="Google Shape;469;g51bd0dfde3_0_30:notes"/>
+          <p:cNvPr id="470" name="Google Shape;470;g51bd0dfde3_0_30:notes"/>
           <p:cNvSpPr/>
           <p:nvPr>
             <p:ph idx="2" type="sldImg"/>
@@ -5926,7 +5926,7 @@
       </p:sp>
       <p:sp>
         <p:nvSpPr>
-          <p:cNvPr id="470" name="Google Shape;470;g51bd0dfde3_0_30:notes"/>
+          <p:cNvPr id="471" name="Google Shape;471;g51bd0dfde3_0_30:notes"/>
           <p:cNvSpPr txBox="1"/>
           <p:nvPr>
             <p:ph idx="1" type="body"/>
@@ -20835,7 +20835,7 @@
                   <a:srgbClr val="000000"/>
                 </a:solidFill>
               </a:rPr>
-              <a:t>Piece of code that will be executed if a condition is true</a:t>
+              <a:t>Piece of code that will be executed if a condition is true. Examples</a:t>
             </a:r>
             <a:endParaRPr>
               <a:solidFill>
@@ -20854,7 +20854,7 @@
         <p:spPr>
           <a:xfrm>
             <a:off x="679200" y="1752875"/>
-            <a:ext cx="7785600" cy="2360700"/>
+            <a:ext cx="7785600" cy="2699700"/>
           </a:xfrm>
           <a:prstGeom prst="rect">
             <a:avLst/>
@@ -20931,20 +20931,87 @@
               <a:spcAft>
                 <a:spcPts val="0"/>
               </a:spcAft>
-              <a:buClr>
-                <a:schemeClr val="dk1"/>
-              </a:buClr>
-              <a:buSzPts val="1100"/>
-              <a:buFont typeface="Arial"/>
-              <a:buNone/>
-            </a:pPr>
+              <a:buNone/>
+            </a:pPr>
+            <a:r>
+              <a:rPr b="1" lang="es">
+                <a:solidFill>
+                  <a:schemeClr val="dk2"/>
+                </a:solidFill>
+              </a:rPr>
+              <a:t>if [</a:t>
+            </a:r>
             <a:r>
               <a:rPr lang="es">
                 <a:solidFill>
                   <a:schemeClr val="dk2"/>
                 </a:solidFill>
               </a:rPr>
-              <a:t>#My first if statement</a:t>
+              <a:t> -f file.txt </a:t>
+            </a:r>
+            <a:r>
+              <a:rPr b="1" lang="es">
+                <a:solidFill>
+                  <a:schemeClr val="dk2"/>
+                </a:solidFill>
+              </a:rPr>
+              <a:t>]</a:t>
+            </a:r>
+            <a:endParaRPr b="1">
+              <a:solidFill>
+                <a:schemeClr val="dk2"/>
+              </a:solidFill>
+            </a:endParaRPr>
+          </a:p>
+          <a:p>
+            <a:pPr indent="0" lvl="0" marL="0" rtl="0" algn="l">
+              <a:spcBef>
+                <a:spcPts val="0"/>
+              </a:spcBef>
+              <a:spcAft>
+                <a:spcPts val="0"/>
+              </a:spcAft>
+              <a:buNone/>
+            </a:pPr>
+            <a:r>
+              <a:rPr b="1" lang="es">
+                <a:solidFill>
+                  <a:schemeClr val="dk2"/>
+                </a:solidFill>
+              </a:rPr>
+              <a:t>then</a:t>
+            </a:r>
+            <a:endParaRPr b="1">
+              <a:solidFill>
+                <a:schemeClr val="dk2"/>
+              </a:solidFill>
+            </a:endParaRPr>
+          </a:p>
+          <a:p>
+            <a:pPr indent="0" lvl="0" marL="0" rtl="0" algn="l">
+              <a:spcBef>
+                <a:spcPts val="0"/>
+              </a:spcBef>
+              <a:spcAft>
+                <a:spcPts val="0"/>
+              </a:spcAft>
+              <a:buNone/>
+            </a:pPr>
+            <a:r>
+              <a:rPr b="1" lang="es">
+                <a:solidFill>
+                  <a:schemeClr val="dk2"/>
+                </a:solidFill>
+              </a:rPr>
+              <a:t>	</a:t>
+            </a:r>
+            <a:r>
+              <a:rPr lang="es">
+                <a:solidFill>
+                  <a:schemeClr val="dk2"/>
+                </a:solidFill>
+              </a:rPr>
+              <a:t>[Commands will be executed if file exists]</a:t>
             </a:r>
             <a:endParaRPr>
               <a:solidFill>
@@ -20968,23 +21035,7 @@
                   <a:schemeClr val="dk2"/>
                 </a:solidFill>
               </a:rPr>
-              <a:t>if [</a:t>
-            </a:r>
-            <a:r>
-              <a:rPr lang="es">
-                <a:solidFill>
-                  <a:schemeClr val="dk2"/>
-                </a:solidFill>
-              </a:rPr>
-              <a:t> condition </a:t>
-            </a:r>
-            <a:r>
-              <a:rPr b="1" lang="es">
-                <a:solidFill>
-                  <a:schemeClr val="dk2"/>
-                </a:solidFill>
-              </a:rPr>
-              <a:t>]</a:t>
+              <a:t>fi</a:t>
             </a:r>
             <a:endParaRPr b="1">
               <a:solidFill>
@@ -21003,12 +21054,7 @@
               <a:buNone/>
             </a:pPr>
             <a:r>
-              <a:rPr b="1" lang="es">
-                <a:solidFill>
-                  <a:schemeClr val="dk2"/>
-                </a:solidFill>
-              </a:rPr>
-              <a:t>then</a:t>
+              <a:t/>
             </a:r>
             <a:endParaRPr b="1">
               <a:solidFill>
@@ -21032,7 +21078,7 @@
                   <a:schemeClr val="dk2"/>
                 </a:solidFill>
               </a:rPr>
-              <a:t>	</a:t>
+              <a:t>if [ </a:t>
             </a:r>
             <a:r>
               <a:rPr lang="es">
@@ -21040,31 +21086,15 @@
                   <a:schemeClr val="dk2"/>
                 </a:solidFill>
               </a:rPr>
-              <a:t>[Commands that will be executed if condition is true]</a:t>
-            </a:r>
-            <a:endParaRPr>
-              <a:solidFill>
-                <a:schemeClr val="dk2"/>
-              </a:solidFill>
-            </a:endParaRPr>
-          </a:p>
-          <a:p>
-            <a:pPr indent="0" lvl="0" marL="0" rtl="0" algn="l">
-              <a:spcBef>
-                <a:spcPts val="0"/>
-              </a:spcBef>
-              <a:spcAft>
-                <a:spcPts val="0"/>
-              </a:spcAft>
-              <a:buNone/>
-            </a:pPr>
+              <a:t>-d folder</a:t>
+            </a:r>
             <a:r>
               <a:rPr b="1" lang="es">
                 <a:solidFill>
                   <a:schemeClr val="dk2"/>
                 </a:solidFill>
               </a:rPr>
-              <a:t>else</a:t>
+              <a:t> ]</a:t>
             </a:r>
             <a:endParaRPr b="1">
               <a:solidFill>
@@ -21088,15 +21118,31 @@
                   <a:schemeClr val="dk2"/>
                 </a:solidFill>
               </a:rPr>
-              <a:t>	</a:t>
-            </a:r>
+              <a:t>then</a:t>
+            </a:r>
+            <a:endParaRPr b="1">
+              <a:solidFill>
+                <a:schemeClr val="dk2"/>
+              </a:solidFill>
+            </a:endParaRPr>
+          </a:p>
+          <a:p>
+            <a:pPr indent="0" lvl="0" marL="0" rtl="0" algn="l">
+              <a:spcBef>
+                <a:spcPts val="0"/>
+              </a:spcBef>
+              <a:spcAft>
+                <a:spcPts val="0"/>
+              </a:spcAft>
+              <a:buNone/>
+            </a:pPr>
             <a:r>
               <a:rPr lang="es">
                 <a:solidFill>
                   <a:schemeClr val="dk2"/>
                 </a:solidFill>
               </a:rPr>
-              <a:t>[Commands that will be executed if the condition is false]</a:t>
+              <a:t>	[Commands will be executed if folder exists]</a:t>
             </a:r>
             <a:endParaRPr>
               <a:solidFill>
@@ -21366,7 +21412,7 @@
                   <a:schemeClr val="dk2"/>
                 </a:solidFill>
               </a:rPr>
-              <a:t>for (</a:t>
+              <a:t>for </a:t>
             </a:r>
             <a:r>
               <a:rPr lang="es">
@@ -21374,17 +21420,9 @@
                   <a:schemeClr val="dk2"/>
                 </a:solidFill>
               </a:rPr>
-              <a:t> </a:t>
-            </a:r>
-            <a:r>
-              <a:rPr b="1" lang="es">
-                <a:solidFill>
-                  <a:schemeClr val="dk2"/>
-                </a:solidFill>
-              </a:rPr>
-              <a:t>)</a:t>
-            </a:r>
-            <a:endParaRPr b="1">
+              <a:t>[times]</a:t>
+            </a:r>
+            <a:endParaRPr>
               <a:solidFill>
                 <a:schemeClr val="dk2"/>
               </a:solidFill>
@@ -21575,7 +21613,7 @@
                   <a:srgbClr val="000000"/>
                 </a:solidFill>
               </a:rPr>
-              <a:t>Piece of code that will be executed several times</a:t>
+              <a:t>Piece of code that will be executed several times. Examples</a:t>
             </a:r>
             <a:endParaRPr>
               <a:solidFill>
@@ -21594,7 +21632,7 @@
         <p:spPr>
           <a:xfrm>
             <a:off x="679200" y="1752875"/>
-            <a:ext cx="7785600" cy="2360700"/>
+            <a:ext cx="7785600" cy="2546100"/>
           </a:xfrm>
           <a:prstGeom prst="rect">
             <a:avLst/>
@@ -21671,20 +21709,95 @@
               <a:spcAft>
                 <a:spcPts val="0"/>
               </a:spcAft>
-              <a:buClr>
-                <a:schemeClr val="dk1"/>
-              </a:buClr>
-              <a:buSzPts val="1100"/>
-              <a:buFont typeface="Arial"/>
-              <a:buNone/>
-            </a:pPr>
+              <a:buNone/>
+            </a:pPr>
+            <a:r>
+              <a:rPr b="1" lang="es">
+                <a:solidFill>
+                  <a:schemeClr val="dk2"/>
+                </a:solidFill>
+              </a:rPr>
+              <a:t>for </a:t>
+            </a:r>
             <a:r>
               <a:rPr lang="es">
                 <a:solidFill>
                   <a:schemeClr val="dk2"/>
                 </a:solidFill>
               </a:rPr>
-              <a:t>#My first for loop</a:t>
+              <a:t>variable</a:t>
+            </a:r>
+            <a:r>
+              <a:rPr b="1" lang="es">
+                <a:solidFill>
+                  <a:schemeClr val="dk2"/>
+                </a:solidFill>
+              </a:rPr>
+              <a:t> in </a:t>
+            </a:r>
+            <a:r>
+              <a:rPr lang="es">
+                <a:solidFill>
+                  <a:schemeClr val="dk2"/>
+                </a:solidFill>
+              </a:rPr>
+              <a:t>*.txt</a:t>
+            </a:r>
+            <a:endParaRPr b="1">
+              <a:solidFill>
+                <a:schemeClr val="dk2"/>
+              </a:solidFill>
+            </a:endParaRPr>
+          </a:p>
+          <a:p>
+            <a:pPr indent="0" lvl="0" marL="0" rtl="0" algn="l">
+              <a:spcBef>
+                <a:spcPts val="0"/>
+              </a:spcBef>
+              <a:spcAft>
+                <a:spcPts val="0"/>
+              </a:spcAft>
+              <a:buNone/>
+            </a:pPr>
+            <a:r>
+              <a:rPr b="1" lang="es">
+                <a:solidFill>
+                  <a:schemeClr val="dk2"/>
+                </a:solidFill>
+              </a:rPr>
+              <a:t>do</a:t>
+            </a:r>
+            <a:endParaRPr b="1">
+              <a:solidFill>
+                <a:schemeClr val="dk2"/>
+              </a:solidFill>
+            </a:endParaRPr>
+          </a:p>
+          <a:p>
+            <a:pPr indent="0" lvl="0" marL="0" rtl="0" algn="l">
+              <a:spcBef>
+                <a:spcPts val="0"/>
+              </a:spcBef>
+              <a:spcAft>
+                <a:spcPts val="0"/>
+              </a:spcAft>
+              <a:buNone/>
+            </a:pPr>
+            <a:r>
+              <a:rPr b="1" lang="es">
+                <a:solidFill>
+                  <a:schemeClr val="dk2"/>
+                </a:solidFill>
+              </a:rPr>
+              <a:t>	</a:t>
+            </a:r>
+            <a:r>
+              <a:rPr lang="es">
+                <a:solidFill>
+                  <a:schemeClr val="dk2"/>
+                </a:solidFill>
+              </a:rPr>
+              <a:t>[Commands will be executed in all txt files that are in the folder]</a:t>
             </a:r>
             <a:endParaRPr>
               <a:solidFill>
@@ -21708,23 +21821,7 @@
                   <a:schemeClr val="dk2"/>
                 </a:solidFill>
               </a:rPr>
-              <a:t>for (</a:t>
-            </a:r>
-            <a:r>
-              <a:rPr lang="es">
-                <a:solidFill>
-                  <a:schemeClr val="dk2"/>
-                </a:solidFill>
-              </a:rPr>
-              <a:t> </a:t>
-            </a:r>
-            <a:r>
-              <a:rPr b="1" lang="es">
-                <a:solidFill>
-                  <a:schemeClr val="dk2"/>
-                </a:solidFill>
-              </a:rPr>
-              <a:t>)</a:t>
+              <a:t>done</a:t>
             </a:r>
             <a:endParaRPr b="1">
               <a:solidFill>
@@ -21743,12 +21840,7 @@
               <a:buNone/>
             </a:pPr>
             <a:r>
-              <a:rPr b="1" lang="es">
-                <a:solidFill>
-                  <a:schemeClr val="dk2"/>
-                </a:solidFill>
-              </a:rPr>
-              <a:t>do</a:t>
+              <a:t/>
             </a:r>
             <a:endParaRPr b="1">
               <a:solidFill>
@@ -21772,7 +21864,7 @@
                   <a:schemeClr val="dk2"/>
                 </a:solidFill>
               </a:rPr>
-              <a:t>	</a:t>
+              <a:t>for </a:t>
             </a:r>
             <a:r>
               <a:rPr lang="es">
@@ -21780,7 +21872,23 @@
                   <a:schemeClr val="dk2"/>
                 </a:solidFill>
               </a:rPr>
-              <a:t>[Commands that will be executed several times]</a:t>
+              <a:t>variable</a:t>
+            </a:r>
+            <a:r>
+              <a:rPr b="1" lang="es">
+                <a:solidFill>
+                  <a:schemeClr val="dk2"/>
+                </a:solidFill>
+              </a:rPr>
+              <a:t> in </a:t>
+            </a:r>
+            <a:r>
+              <a:rPr lang="es">
+                <a:solidFill>
+                  <a:schemeClr val="dk2"/>
+                </a:solidFill>
+              </a:rPr>
+              <a:t>file1 file2 file3 file4</a:t>
             </a:r>
             <a:endParaRPr>
               <a:solidFill>
@@ -21804,13 +21912,115 @@
                   <a:schemeClr val="dk2"/>
                 </a:solidFill>
               </a:rPr>
-              <a:t>done</a:t>
+              <a:t>do</a:t>
             </a:r>
             <a:endParaRPr b="1">
               <a:solidFill>
                 <a:schemeClr val="dk2"/>
               </a:solidFill>
             </a:endParaRPr>
+          </a:p>
+          <a:p>
+            <a:pPr indent="0" lvl="0" marL="0" rtl="0" algn="l">
+              <a:spcBef>
+                <a:spcPts val="0"/>
+              </a:spcBef>
+              <a:spcAft>
+                <a:spcPts val="0"/>
+              </a:spcAft>
+              <a:buNone/>
+            </a:pPr>
+            <a:r>
+              <a:rPr b="1" lang="es">
+                <a:solidFill>
+                  <a:schemeClr val="dk2"/>
+                </a:solidFill>
+              </a:rPr>
+              <a:t>	</a:t>
+            </a:r>
+            <a:r>
+              <a:rPr lang="es">
+                <a:solidFill>
+                  <a:schemeClr val="dk2"/>
+                </a:solidFill>
+              </a:rPr>
+              <a:t>[Commands will be executed only in file1, file2, file3, and file4]</a:t>
+            </a:r>
+            <a:endParaRPr>
+              <a:solidFill>
+                <a:schemeClr val="dk2"/>
+              </a:solidFill>
+            </a:endParaRPr>
+          </a:p>
+          <a:p>
+            <a:pPr indent="0" lvl="0" marL="0" rtl="0" algn="l">
+              <a:spcBef>
+                <a:spcPts val="0"/>
+              </a:spcBef>
+              <a:spcAft>
+                <a:spcPts val="0"/>
+              </a:spcAft>
+              <a:buNone/>
+            </a:pPr>
+            <a:r>
+              <a:rPr b="1" lang="es">
+                <a:solidFill>
+                  <a:schemeClr val="dk2"/>
+                </a:solidFill>
+              </a:rPr>
+              <a:t>done</a:t>
+            </a:r>
+            <a:endParaRPr b="1">
+              <a:solidFill>
+                <a:schemeClr val="dk2"/>
+              </a:solidFill>
+            </a:endParaRPr>
+          </a:p>
+        </p:txBody>
+      </p:sp>
+      <p:sp>
+        <p:nvSpPr>
+          <p:cNvPr id="401" name="Google Shape;401;p59"/>
+          <p:cNvSpPr txBox="1"/>
+          <p:nvPr/>
+        </p:nvSpPr>
+        <p:spPr>
+          <a:xfrm>
+            <a:off x="3071700" y="4409500"/>
+            <a:ext cx="5393100" cy="441300"/>
+          </a:xfrm>
+          <a:prstGeom prst="rect">
+            <a:avLst/>
+          </a:prstGeom>
+          <a:noFill/>
+          <a:ln>
+            <a:noFill/>
+          </a:ln>
+        </p:spPr>
+        <p:txBody>
+          <a:bodyPr anchorCtr="0" anchor="t" bIns="91425" lIns="91425" spcFirstLastPara="1" rIns="91425" wrap="square" tIns="91425">
+            <a:noAutofit/>
+          </a:bodyPr>
+          <a:lstStyle/>
+          <a:p>
+            <a:pPr indent="0" lvl="0" marL="0" rtl="0" algn="l">
+              <a:spcBef>
+                <a:spcPts val="0"/>
+              </a:spcBef>
+              <a:spcAft>
+                <a:spcPts val="0"/>
+              </a:spcAft>
+              <a:buNone/>
+            </a:pPr>
+            <a:r>
+              <a:rPr b="1" lang="es"/>
+              <a:t>More examples</a:t>
+            </a:r>
+            <a:r>
+              <a:rPr lang="es"/>
+              <a:t> → https://www.poftut.com/linux-bash-loop-files/</a:t>
+            </a:r>
+            <a:endParaRPr/>
           </a:p>
         </p:txBody>
       </p:sp>
@@ -21827,7 +22037,7 @@
   <p:cSld>
     <p:spTree>
       <p:nvGrpSpPr>
-        <p:cNvPr id="404" name="Shape 404"/>
+        <p:cNvPr id="405" name="Shape 405"/>
         <p:cNvGrpSpPr/>
         <p:nvPr/>
       </p:nvGrpSpPr>
@@ -21841,7 +22051,7 @@
       </p:grpSpPr>
       <p:sp>
         <p:nvSpPr>
-          <p:cNvPr id="405" name="Google Shape;405;p60"/>
+          <p:cNvPr id="406" name="Google Shape;406;p60"/>
           <p:cNvSpPr txBox="1"/>
           <p:nvPr>
             <p:ph type="title"/>
@@ -21881,7 +22091,7 @@
       </p:sp>
       <p:pic>
         <p:nvPicPr>
-          <p:cNvPr id="406" name="Google Shape;406;p60"/>
+          <p:cNvPr id="407" name="Google Shape;407;p60"/>
           <p:cNvPicPr preferRelativeResize="0"/>
           <p:nvPr/>
         </p:nvPicPr>
@@ -21919,7 +22129,7 @@
   <p:cSld>
     <p:spTree>
       <p:nvGrpSpPr>
-        <p:cNvPr id="410" name="Shape 410"/>
+        <p:cNvPr id="411" name="Shape 411"/>
         <p:cNvGrpSpPr/>
         <p:nvPr/>
       </p:nvGrpSpPr>
@@ -21933,7 +22143,7 @@
       </p:grpSpPr>
       <p:sp>
         <p:nvSpPr>
-          <p:cNvPr id="411" name="Google Shape;411;p61"/>
+          <p:cNvPr id="412" name="Google Shape;412;p61"/>
           <p:cNvSpPr txBox="1"/>
           <p:nvPr>
             <p:ph type="title"/>
@@ -21973,7 +22183,7 @@
       </p:sp>
       <p:pic>
         <p:nvPicPr>
-          <p:cNvPr id="412" name="Google Shape;412;p61"/>
+          <p:cNvPr id="413" name="Google Shape;413;p61"/>
           <p:cNvPicPr preferRelativeResize="0"/>
           <p:nvPr/>
         </p:nvPicPr>
@@ -22143,7 +22353,7 @@
   <p:cSld>
     <p:spTree>
       <p:nvGrpSpPr>
-        <p:cNvPr id="416" name="Shape 416"/>
+        <p:cNvPr id="417" name="Shape 417"/>
         <p:cNvGrpSpPr/>
         <p:nvPr/>
       </p:nvGrpSpPr>
@@ -22157,7 +22367,7 @@
       </p:grpSpPr>
       <p:sp>
         <p:nvSpPr>
-          <p:cNvPr id="417" name="Google Shape;417;p62"/>
+          <p:cNvPr id="418" name="Google Shape;418;p62"/>
           <p:cNvSpPr txBox="1"/>
           <p:nvPr>
             <p:ph type="title"/>
@@ -22195,34 +22405,6 @@
           </a:p>
         </p:txBody>
       </p:sp>
-      <p:pic>
-        <p:nvPicPr>
-          <p:cNvPr id="418" name="Google Shape;418;p62"/>
-          <p:cNvPicPr preferRelativeResize="0"/>
-          <p:nvPr/>
-        </p:nvPicPr>
-        <p:blipFill>
-          <a:blip r:embed="rId3">
-            <a:alphaModFix/>
-          </a:blip>
-          <a:stretch>
-            <a:fillRect/>
-          </a:stretch>
-        </p:blipFill>
-        <p:spPr>
-          <a:xfrm>
-            <a:off x="3469425" y="1164325"/>
-            <a:ext cx="2205151" cy="1594025"/>
-          </a:xfrm>
-          <a:prstGeom prst="rect">
-            <a:avLst/>
-          </a:prstGeom>
-          <a:noFill/>
-          <a:ln>
-            <a:noFill/>
-          </a:ln>
-        </p:spPr>
-      </p:pic>
       <p:pic>
         <p:nvPicPr>
           <p:cNvPr id="419" name="Google Shape;419;p62"/>
@@ -22239,7 +22421,7 @@
         </p:blipFill>
         <p:spPr>
           <a:xfrm>
-            <a:off x="6493425" y="1310025"/>
+            <a:off x="3469425" y="1164325"/>
             <a:ext cx="2205151" cy="1594025"/>
           </a:xfrm>
           <a:prstGeom prst="rect">
@@ -22267,7 +22449,7 @@
         </p:blipFill>
         <p:spPr>
           <a:xfrm>
-            <a:off x="464100" y="3241200"/>
+            <a:off x="6493425" y="1310025"/>
             <a:ext cx="2205151" cy="1594025"/>
           </a:xfrm>
           <a:prstGeom prst="rect">
@@ -22295,7 +22477,7 @@
         </p:blipFill>
         <p:spPr>
           <a:xfrm>
-            <a:off x="3443025" y="3196350"/>
+            <a:off x="464100" y="3241200"/>
             <a:ext cx="2205151" cy="1594025"/>
           </a:xfrm>
           <a:prstGeom prst="rect">
@@ -22323,7 +22505,7 @@
         </p:blipFill>
         <p:spPr>
           <a:xfrm>
-            <a:off x="6493425" y="3196350"/>
+            <a:off x="3443025" y="3196350"/>
             <a:ext cx="2205151" cy="1594025"/>
           </a:xfrm>
           <a:prstGeom prst="rect">
@@ -22351,7 +22533,7 @@
         </p:blipFill>
         <p:spPr>
           <a:xfrm>
-            <a:off x="311700" y="1190600"/>
+            <a:off x="6493425" y="3196350"/>
             <a:ext cx="2205151" cy="1594025"/>
           </a:xfrm>
           <a:prstGeom prst="rect">
@@ -22363,12 +22545,40 @@
           </a:ln>
         </p:spPr>
       </p:pic>
+      <p:pic>
+        <p:nvPicPr>
+          <p:cNvPr id="424" name="Google Shape;424;p62"/>
+          <p:cNvPicPr preferRelativeResize="0"/>
+          <p:nvPr/>
+        </p:nvPicPr>
+        <p:blipFill>
+          <a:blip r:embed="rId3">
+            <a:alphaModFix/>
+          </a:blip>
+          <a:stretch>
+            <a:fillRect/>
+          </a:stretch>
+        </p:blipFill>
+        <p:spPr>
+          <a:xfrm>
+            <a:off x="311700" y="1190600"/>
+            <a:ext cx="2205151" cy="1594025"/>
+          </a:xfrm>
+          <a:prstGeom prst="rect">
+            <a:avLst/>
+          </a:prstGeom>
+          <a:noFill/>
+          <a:ln>
+            <a:noFill/>
+          </a:ln>
+        </p:spPr>
+      </p:pic>
       <p:cxnSp>
         <p:nvCxnSpPr>
-          <p:cNvPr id="424" name="Google Shape;424;p62"/>
+          <p:cNvPr id="425" name="Google Shape;425;p62"/>
           <p:cNvCxnSpPr>
-            <a:stCxn id="423" idx="3"/>
-            <a:endCxn id="418" idx="1"/>
+            <a:stCxn id="424" idx="3"/>
+            <a:endCxn id="419" idx="1"/>
           </p:cNvCxnSpPr>
           <p:nvPr/>
         </p:nvCxnSpPr>
@@ -22394,9 +22604,9 @@
       </p:cxnSp>
       <p:cxnSp>
         <p:nvCxnSpPr>
-          <p:cNvPr id="425" name="Google Shape;425;p62"/>
+          <p:cNvPr id="426" name="Google Shape;426;p62"/>
           <p:cNvCxnSpPr>
-            <a:endCxn id="419" idx="1"/>
+            <a:endCxn id="420" idx="1"/>
           </p:cNvCxnSpPr>
           <p:nvPr/>
         </p:nvCxnSpPr>
@@ -22422,10 +22632,10 @@
       </p:cxnSp>
       <p:cxnSp>
         <p:nvCxnSpPr>
-          <p:cNvPr id="426" name="Google Shape;426;p62"/>
+          <p:cNvPr id="427" name="Google Shape;427;p62"/>
           <p:cNvCxnSpPr>
-            <a:stCxn id="422" idx="0"/>
-            <a:endCxn id="419" idx="2"/>
+            <a:stCxn id="423" idx="0"/>
+            <a:endCxn id="420" idx="2"/>
           </p:cNvCxnSpPr>
           <p:nvPr/>
         </p:nvCxnSpPr>
@@ -22451,10 +22661,10 @@
       </p:cxnSp>
       <p:cxnSp>
         <p:nvCxnSpPr>
-          <p:cNvPr id="427" name="Google Shape;427;p62"/>
+          <p:cNvPr id="428" name="Google Shape;428;p62"/>
           <p:cNvCxnSpPr>
-            <a:stCxn id="421" idx="3"/>
-            <a:endCxn id="422" idx="1"/>
+            <a:stCxn id="422" idx="3"/>
+            <a:endCxn id="423" idx="1"/>
           </p:cNvCxnSpPr>
           <p:nvPr/>
         </p:nvCxnSpPr>
@@ -22480,9 +22690,9 @@
       </p:cxnSp>
       <p:cxnSp>
         <p:nvCxnSpPr>
-          <p:cNvPr id="428" name="Google Shape;428;p62"/>
+          <p:cNvPr id="429" name="Google Shape;429;p62"/>
           <p:cNvCxnSpPr>
-            <a:endCxn id="420" idx="3"/>
+            <a:endCxn id="421" idx="3"/>
           </p:cNvCxnSpPr>
           <p:nvPr/>
         </p:nvCxnSpPr>
@@ -22508,10 +22718,10 @@
       </p:cxnSp>
       <p:cxnSp>
         <p:nvCxnSpPr>
-          <p:cNvPr id="429" name="Google Shape;429;p62"/>
+          <p:cNvPr id="430" name="Google Shape;430;p62"/>
           <p:cNvCxnSpPr>
-            <a:stCxn id="420" idx="0"/>
-            <a:endCxn id="423" idx="2"/>
+            <a:stCxn id="421" idx="0"/>
+            <a:endCxn id="424" idx="2"/>
           </p:cNvCxnSpPr>
           <p:nvPr/>
         </p:nvCxnSpPr>
@@ -22548,7 +22758,7 @@
   <p:cSld>
     <p:spTree>
       <p:nvGrpSpPr>
-        <p:cNvPr id="433" name="Shape 433"/>
+        <p:cNvPr id="434" name="Shape 434"/>
         <p:cNvGrpSpPr/>
         <p:nvPr/>
       </p:nvGrpSpPr>
@@ -22562,7 +22772,7 @@
       </p:grpSpPr>
       <p:sp>
         <p:nvSpPr>
-          <p:cNvPr id="434" name="Google Shape;434;p63"/>
+          <p:cNvPr id="435" name="Google Shape;435;p63"/>
           <p:cNvSpPr txBox="1"/>
           <p:nvPr>
             <p:ph type="title"/>
@@ -22602,7 +22812,7 @@
       </p:sp>
       <p:sp>
         <p:nvSpPr>
-          <p:cNvPr id="435" name="Google Shape;435;p63"/>
+          <p:cNvPr id="436" name="Google Shape;436;p63"/>
           <p:cNvSpPr txBox="1"/>
           <p:nvPr>
             <p:ph idx="1" type="body"/>
@@ -22745,7 +22955,7 @@
   <p:cSld>
     <p:spTree>
       <p:nvGrpSpPr>
-        <p:cNvPr id="439" name="Shape 439"/>
+        <p:cNvPr id="440" name="Shape 440"/>
         <p:cNvGrpSpPr/>
         <p:nvPr/>
       </p:nvGrpSpPr>
@@ -22759,7 +22969,7 @@
       </p:grpSpPr>
       <p:sp>
         <p:nvSpPr>
-          <p:cNvPr id="440" name="Google Shape;440;p64"/>
+          <p:cNvPr id="441" name="Google Shape;441;p64"/>
           <p:cNvSpPr txBox="1"/>
           <p:nvPr>
             <p:ph type="title"/>
@@ -22799,7 +23009,7 @@
       </p:sp>
       <p:sp>
         <p:nvSpPr>
-          <p:cNvPr id="441" name="Google Shape;441;p64"/>
+          <p:cNvPr id="442" name="Google Shape;442;p64"/>
           <p:cNvSpPr txBox="1"/>
           <p:nvPr>
             <p:ph idx="1" type="body"/>
@@ -22930,7 +23140,7 @@
   <p:cSld>
     <p:spTree>
       <p:nvGrpSpPr>
-        <p:cNvPr id="445" name="Shape 445"/>
+        <p:cNvPr id="446" name="Shape 446"/>
         <p:cNvGrpSpPr/>
         <p:nvPr/>
       </p:nvGrpSpPr>
@@ -22944,7 +23154,7 @@
       </p:grpSpPr>
       <p:sp>
         <p:nvSpPr>
-          <p:cNvPr id="446" name="Google Shape;446;p65"/>
+          <p:cNvPr id="447" name="Google Shape;447;p65"/>
           <p:cNvSpPr txBox="1"/>
           <p:nvPr>
             <p:ph type="title"/>
@@ -22984,7 +23194,7 @@
       </p:sp>
       <p:sp>
         <p:nvSpPr>
-          <p:cNvPr id="447" name="Google Shape;447;p65"/>
+          <p:cNvPr id="448" name="Google Shape;448;p65"/>
           <p:cNvSpPr txBox="1"/>
           <p:nvPr>
             <p:ph idx="1" type="body"/>
@@ -23147,7 +23357,7 @@
   <p:cSld>
     <p:spTree>
       <p:nvGrpSpPr>
-        <p:cNvPr id="451" name="Shape 451"/>
+        <p:cNvPr id="452" name="Shape 452"/>
         <p:cNvGrpSpPr/>
         <p:nvPr/>
       </p:nvGrpSpPr>
@@ -23161,7 +23371,7 @@
       </p:grpSpPr>
       <p:sp>
         <p:nvSpPr>
-          <p:cNvPr id="452" name="Google Shape;452;p66"/>
+          <p:cNvPr id="453" name="Google Shape;453;p66"/>
           <p:cNvSpPr txBox="1"/>
           <p:nvPr>
             <p:ph type="title"/>
@@ -23205,7 +23415,7 @@
       </p:sp>
       <p:sp>
         <p:nvSpPr>
-          <p:cNvPr id="453" name="Google Shape;453;p66"/>
+          <p:cNvPr id="454" name="Google Shape;454;p66"/>
           <p:cNvSpPr txBox="1"/>
           <p:nvPr>
             <p:ph idx="1" type="body"/>
@@ -23399,7 +23609,7 @@
   <p:cSld>
     <p:spTree>
       <p:nvGrpSpPr>
-        <p:cNvPr id="457" name="Shape 457"/>
+        <p:cNvPr id="458" name="Shape 458"/>
         <p:cNvGrpSpPr/>
         <p:nvPr/>
       </p:nvGrpSpPr>
@@ -23413,7 +23623,7 @@
       </p:grpSpPr>
       <p:sp>
         <p:nvSpPr>
-          <p:cNvPr id="458" name="Google Shape;458;p67"/>
+          <p:cNvPr id="459" name="Google Shape;459;p67"/>
           <p:cNvSpPr txBox="1"/>
           <p:nvPr>
             <p:ph type="title"/>
@@ -23453,7 +23663,7 @@
       </p:sp>
       <p:sp>
         <p:nvSpPr>
-          <p:cNvPr id="459" name="Google Shape;459;p67"/>
+          <p:cNvPr id="460" name="Google Shape;460;p67"/>
           <p:cNvSpPr txBox="1"/>
           <p:nvPr>
             <p:ph idx="1" type="body"/>
@@ -23517,7 +23727,7 @@
   <p:cSld>
     <p:spTree>
       <p:nvGrpSpPr>
-        <p:cNvPr id="463" name="Shape 463"/>
+        <p:cNvPr id="464" name="Shape 464"/>
         <p:cNvGrpSpPr/>
         <p:nvPr/>
       </p:nvGrpSpPr>
@@ -23531,7 +23741,7 @@
       </p:grpSpPr>
       <p:sp>
         <p:nvSpPr>
-          <p:cNvPr id="464" name="Google Shape;464;p68"/>
+          <p:cNvPr id="465" name="Google Shape;465;p68"/>
           <p:cNvSpPr txBox="1"/>
           <p:nvPr>
             <p:ph idx="1" type="body"/>
@@ -23660,7 +23870,7 @@
       </p:sp>
       <p:sp>
         <p:nvSpPr>
-          <p:cNvPr id="465" name="Google Shape;465;p68"/>
+          <p:cNvPr id="466" name="Google Shape;466;p68"/>
           <p:cNvSpPr txBox="1"/>
           <p:nvPr>
             <p:ph type="title"/>
@@ -23704,7 +23914,7 @@
       </p:sp>
       <p:pic>
         <p:nvPicPr>
-          <p:cNvPr id="466" name="Google Shape;466;p68"/>
+          <p:cNvPr id="467" name="Google Shape;467;p68"/>
           <p:cNvPicPr preferRelativeResize="0"/>
           <p:nvPr/>
         </p:nvPicPr>
@@ -23732,7 +23942,7 @@
       </p:pic>
       <p:pic>
         <p:nvPicPr>
-          <p:cNvPr id="467" name="Google Shape;467;p68"/>
+          <p:cNvPr id="468" name="Google Shape;468;p68"/>
           <p:cNvPicPr preferRelativeResize="0"/>
           <p:nvPr/>
         </p:nvPicPr>
@@ -23771,7 +23981,7 @@
   <p:cSld>
     <p:spTree>
       <p:nvGrpSpPr>
-        <p:cNvPr id="471" name="Shape 471"/>
+        <p:cNvPr id="472" name="Shape 472"/>
         <p:cNvGrpSpPr/>
         <p:nvPr/>
       </p:nvGrpSpPr>
@@ -23785,7 +23995,7 @@
       </p:grpSpPr>
       <p:sp>
         <p:nvSpPr>
-          <p:cNvPr id="472" name="Google Shape;472;p69"/>
+          <p:cNvPr id="473" name="Google Shape;473;p69"/>
           <p:cNvSpPr txBox="1"/>
           <p:nvPr>
             <p:ph type="title"/>
@@ -23829,7 +24039,7 @@
       </p:sp>
       <p:sp>
         <p:nvSpPr>
-          <p:cNvPr id="473" name="Google Shape;473;p69"/>
+          <p:cNvPr id="474" name="Google Shape;474;p69"/>
           <p:cNvSpPr txBox="1"/>
           <p:nvPr>
             <p:ph idx="1" type="body"/>
@@ -23920,7 +24130,7 @@
       </p:sp>
       <p:pic>
         <p:nvPicPr>
-          <p:cNvPr id="474" name="Google Shape;474;p69"/>
+          <p:cNvPr id="475" name="Google Shape;475;p69"/>
           <p:cNvPicPr preferRelativeResize="0"/>
           <p:nvPr/>
         </p:nvPicPr>
@@ -23948,7 +24158,7 @@
       </p:pic>
       <p:pic>
         <p:nvPicPr>
-          <p:cNvPr id="475" name="Google Shape;475;p69"/>
+          <p:cNvPr id="476" name="Google Shape;476;p69"/>
           <p:cNvPicPr preferRelativeResize="0"/>
           <p:nvPr/>
         </p:nvPicPr>

</xml_diff>

<commit_message>
Added more additional exercises to presentation
</commit_message>
<xml_diff>
--- a/Introduction to Linux.pptx
+++ b/Introduction to Linux.pptx
@@ -64,7 +64,6 @@
     <p:sldId id="309" r:id="rId58"/>
     <p:sldId id="310" r:id="rId59"/>
     <p:sldId id="311" r:id="rId60"/>
-    <p:sldId id="312" r:id="rId61"/>
   </p:sldIdLst>
   <p:sldSz cy="5143500" cx="9144000"/>
   <p:notesSz cx="6858000" cy="9144000"/>
@@ -4491,7 +4490,7 @@
   <p:cSld>
     <p:spTree>
       <p:nvGrpSpPr>
-        <p:cNvPr id="373" name="Shape 373"/>
+        <p:cNvPr id="374" name="Shape 374"/>
         <p:cNvGrpSpPr/>
         <p:nvPr/>
       </p:nvGrpSpPr>
@@ -4505,7 +4504,7 @@
       </p:grpSpPr>
       <p:sp>
         <p:nvSpPr>
-          <p:cNvPr id="374" name="Google Shape;374;g500589c4d0_0_29:notes"/>
+          <p:cNvPr id="375" name="Google Shape;375;g500589c4d0_0_29:notes"/>
           <p:cNvSpPr/>
           <p:nvPr>
             <p:ph idx="2" type="sldImg"/>
@@ -4540,7 +4539,7 @@
       </p:sp>
       <p:sp>
         <p:nvSpPr>
-          <p:cNvPr id="375" name="Google Shape;375;g500589c4d0_0_29:notes"/>
+          <p:cNvPr id="376" name="Google Shape;376;g500589c4d0_0_29:notes"/>
           <p:cNvSpPr txBox="1"/>
           <p:nvPr>
             <p:ph idx="1" type="body"/>
@@ -4590,7 +4589,7 @@
   <p:cSld>
     <p:spTree>
       <p:nvGrpSpPr>
-        <p:cNvPr id="380" name="Shape 380"/>
+        <p:cNvPr id="381" name="Shape 381"/>
         <p:cNvGrpSpPr/>
         <p:nvPr/>
       </p:nvGrpSpPr>
@@ -4604,7 +4603,7 @@
       </p:grpSpPr>
       <p:sp>
         <p:nvSpPr>
-          <p:cNvPr id="381" name="Google Shape;381;g51bd0dfde3_0_39:notes"/>
+          <p:cNvPr id="382" name="Google Shape;382;g51bd0dfde3_0_39:notes"/>
           <p:cNvSpPr/>
           <p:nvPr>
             <p:ph idx="2" type="sldImg"/>
@@ -4639,7 +4638,7 @@
       </p:sp>
       <p:sp>
         <p:nvSpPr>
-          <p:cNvPr id="382" name="Google Shape;382;g51bd0dfde3_0_39:notes"/>
+          <p:cNvPr id="383" name="Google Shape;383;g51bd0dfde3_0_39:notes"/>
           <p:cNvSpPr txBox="1"/>
           <p:nvPr>
             <p:ph idx="1" type="body"/>
@@ -4689,7 +4688,7 @@
   <p:cSld>
     <p:spTree>
       <p:nvGrpSpPr>
-        <p:cNvPr id="387" name="Shape 387"/>
+        <p:cNvPr id="389" name="Shape 389"/>
         <p:cNvGrpSpPr/>
         <p:nvPr/>
       </p:nvGrpSpPr>
@@ -4703,7 +4702,7 @@
       </p:grpSpPr>
       <p:sp>
         <p:nvSpPr>
-          <p:cNvPr id="388" name="Google Shape;388;g500589c4d0_0_34:notes"/>
+          <p:cNvPr id="390" name="Google Shape;390;g500589c4d0_0_34:notes"/>
           <p:cNvSpPr/>
           <p:nvPr>
             <p:ph idx="2" type="sldImg"/>
@@ -4738,7 +4737,7 @@
       </p:sp>
       <p:sp>
         <p:nvSpPr>
-          <p:cNvPr id="389" name="Google Shape;389;g500589c4d0_0_34:notes"/>
+          <p:cNvPr id="391" name="Google Shape;391;g500589c4d0_0_34:notes"/>
           <p:cNvSpPr txBox="1"/>
           <p:nvPr>
             <p:ph idx="1" type="body"/>
@@ -4788,7 +4787,7 @@
   <p:cSld>
     <p:spTree>
       <p:nvGrpSpPr>
-        <p:cNvPr id="394" name="Shape 394"/>
+        <p:cNvPr id="396" name="Shape 396"/>
         <p:cNvGrpSpPr/>
         <p:nvPr/>
       </p:nvGrpSpPr>
@@ -4802,7 +4801,7 @@
       </p:grpSpPr>
       <p:sp>
         <p:nvSpPr>
-          <p:cNvPr id="395" name="Google Shape;395;g51bd0dfde3_0_46:notes"/>
+          <p:cNvPr id="397" name="Google Shape;397;g51bd0dfde3_0_46:notes"/>
           <p:cNvSpPr/>
           <p:nvPr>
             <p:ph idx="2" type="sldImg"/>
@@ -4837,7 +4836,7 @@
       </p:sp>
       <p:sp>
         <p:nvSpPr>
-          <p:cNvPr id="396" name="Google Shape;396;g51bd0dfde3_0_46:notes"/>
+          <p:cNvPr id="398" name="Google Shape;398;g51bd0dfde3_0_46:notes"/>
           <p:cNvSpPr txBox="1"/>
           <p:nvPr>
             <p:ph idx="1" type="body"/>
@@ -4887,7 +4886,7 @@
   <p:cSld>
     <p:spTree>
       <p:nvGrpSpPr>
-        <p:cNvPr id="402" name="Shape 402"/>
+        <p:cNvPr id="404" name="Shape 404"/>
         <p:cNvGrpSpPr/>
         <p:nvPr/>
       </p:nvGrpSpPr>
@@ -4901,7 +4900,7 @@
       </p:grpSpPr>
       <p:sp>
         <p:nvSpPr>
-          <p:cNvPr id="403" name="Google Shape;403;g500589c4d0_0_39:notes"/>
+          <p:cNvPr id="405" name="Google Shape;405;g500589c4d0_0_39:notes"/>
           <p:cNvSpPr/>
           <p:nvPr>
             <p:ph idx="2" type="sldImg"/>
@@ -4936,7 +4935,7 @@
       </p:sp>
       <p:sp>
         <p:nvSpPr>
-          <p:cNvPr id="404" name="Google Shape;404;g500589c4d0_0_39:notes"/>
+          <p:cNvPr id="406" name="Google Shape;406;g500589c4d0_0_39:notes"/>
           <p:cNvSpPr txBox="1"/>
           <p:nvPr>
             <p:ph idx="1" type="body"/>
@@ -4986,7 +4985,7 @@
   <p:cSld>
     <p:spTree>
       <p:nvGrpSpPr>
-        <p:cNvPr id="408" name="Shape 408"/>
+        <p:cNvPr id="410" name="Shape 410"/>
         <p:cNvGrpSpPr/>
         <p:nvPr/>
       </p:nvGrpSpPr>
@@ -5000,7 +4999,7 @@
       </p:grpSpPr>
       <p:sp>
         <p:nvSpPr>
-          <p:cNvPr id="409" name="Google Shape;409;g51bd0dfde3_0_54:notes"/>
+          <p:cNvPr id="411" name="Google Shape;411;g51bd0dfde3_0_54:notes"/>
           <p:cNvSpPr/>
           <p:nvPr>
             <p:ph idx="2" type="sldImg"/>
@@ -5035,7 +5034,7 @@
       </p:sp>
       <p:sp>
         <p:nvSpPr>
-          <p:cNvPr id="410" name="Google Shape;410;g51bd0dfde3_0_54:notes"/>
+          <p:cNvPr id="412" name="Google Shape;412;g51bd0dfde3_0_54:notes"/>
           <p:cNvSpPr txBox="1"/>
           <p:nvPr>
             <p:ph idx="1" type="body"/>
@@ -5184,7 +5183,7 @@
   <p:cSld>
     <p:spTree>
       <p:nvGrpSpPr>
-        <p:cNvPr id="414" name="Shape 414"/>
+        <p:cNvPr id="416" name="Shape 416"/>
         <p:cNvGrpSpPr/>
         <p:nvPr/>
       </p:nvGrpSpPr>
@@ -5198,7 +5197,7 @@
       </p:grpSpPr>
       <p:sp>
         <p:nvSpPr>
-          <p:cNvPr id="415" name="Google Shape;415;g51bd0dfde3_0_60:notes"/>
+          <p:cNvPr id="417" name="Google Shape;417;g51bd0dfde3_0_60:notes"/>
           <p:cNvSpPr/>
           <p:nvPr>
             <p:ph idx="2" type="sldImg"/>
@@ -5233,7 +5232,7 @@
       </p:sp>
       <p:sp>
         <p:nvSpPr>
-          <p:cNvPr id="416" name="Google Shape;416;g51bd0dfde3_0_60:notes"/>
+          <p:cNvPr id="418" name="Google Shape;418;g51bd0dfde3_0_60:notes"/>
           <p:cNvSpPr txBox="1"/>
           <p:nvPr>
             <p:ph idx="1" type="body"/>
@@ -5283,7 +5282,7 @@
   <p:cSld>
     <p:spTree>
       <p:nvGrpSpPr>
-        <p:cNvPr id="431" name="Shape 431"/>
+        <p:cNvPr id="433" name="Shape 433"/>
         <p:cNvGrpSpPr/>
         <p:nvPr/>
       </p:nvGrpSpPr>
@@ -5297,7 +5296,7 @@
       </p:grpSpPr>
       <p:sp>
         <p:nvSpPr>
-          <p:cNvPr id="432" name="Google Shape;432;g51bd0dfde3_0_84:notes"/>
+          <p:cNvPr id="434" name="Google Shape;434;g51bd0dfde3_0_84:notes"/>
           <p:cNvSpPr/>
           <p:nvPr>
             <p:ph idx="2" type="sldImg"/>
@@ -5332,7 +5331,7 @@
       </p:sp>
       <p:sp>
         <p:nvSpPr>
-          <p:cNvPr id="433" name="Google Shape;433;g51bd0dfde3_0_84:notes"/>
+          <p:cNvPr id="435" name="Google Shape;435;g51bd0dfde3_0_84:notes"/>
           <p:cNvSpPr txBox="1"/>
           <p:nvPr>
             <p:ph idx="1" type="body"/>
@@ -5382,7 +5381,7 @@
   <p:cSld>
     <p:spTree>
       <p:nvGrpSpPr>
-        <p:cNvPr id="437" name="Shape 437"/>
+        <p:cNvPr id="439" name="Shape 439"/>
         <p:cNvGrpSpPr/>
         <p:nvPr/>
       </p:nvGrpSpPr>
@@ -5396,7 +5395,7 @@
       </p:grpSpPr>
       <p:sp>
         <p:nvSpPr>
-          <p:cNvPr id="438" name="Google Shape;438;g51bd0dfde3_0_89:notes"/>
+          <p:cNvPr id="440" name="Google Shape;440;g51bd0dfde3_0_89:notes"/>
           <p:cNvSpPr/>
           <p:nvPr>
             <p:ph idx="2" type="sldImg"/>
@@ -5431,7 +5430,7 @@
       </p:sp>
       <p:sp>
         <p:nvSpPr>
-          <p:cNvPr id="439" name="Google Shape;439;g51bd0dfde3_0_89:notes"/>
+          <p:cNvPr id="441" name="Google Shape;441;g51bd0dfde3_0_89:notes"/>
           <p:cNvSpPr txBox="1"/>
           <p:nvPr>
             <p:ph idx="1" type="body"/>
@@ -5481,7 +5480,7 @@
   <p:cSld>
     <p:spTree>
       <p:nvGrpSpPr>
-        <p:cNvPr id="443" name="Shape 443"/>
+        <p:cNvPr id="445" name="Shape 445"/>
         <p:cNvGrpSpPr/>
         <p:nvPr/>
       </p:nvGrpSpPr>
@@ -5495,7 +5494,7 @@
       </p:grpSpPr>
       <p:sp>
         <p:nvSpPr>
-          <p:cNvPr id="444" name="Google Shape;444;g51bd0dfde3_0_99:notes"/>
+          <p:cNvPr id="446" name="Google Shape;446;g51bd0dfde3_0_99:notes"/>
           <p:cNvSpPr/>
           <p:nvPr>
             <p:ph idx="2" type="sldImg"/>
@@ -5530,7 +5529,7 @@
       </p:sp>
       <p:sp>
         <p:nvSpPr>
-          <p:cNvPr id="445" name="Google Shape;445;g51bd0dfde3_0_99:notes"/>
+          <p:cNvPr id="447" name="Google Shape;447;g51bd0dfde3_0_99:notes"/>
           <p:cNvSpPr txBox="1"/>
           <p:nvPr>
             <p:ph idx="1" type="body"/>
@@ -5580,7 +5579,7 @@
   <p:cSld>
     <p:spTree>
       <p:nvGrpSpPr>
-        <p:cNvPr id="449" name="Shape 449"/>
+        <p:cNvPr id="451" name="Shape 451"/>
         <p:cNvGrpSpPr/>
         <p:nvPr/>
       </p:nvGrpSpPr>
@@ -5594,7 +5593,7 @@
       </p:grpSpPr>
       <p:sp>
         <p:nvSpPr>
-          <p:cNvPr id="450" name="Google Shape;450;g51bd0dfde3_0_18:notes"/>
+          <p:cNvPr id="452" name="Google Shape;452;g51bd0dfde3_0_18:notes"/>
           <p:cNvSpPr/>
           <p:nvPr>
             <p:ph idx="2" type="sldImg"/>
@@ -5629,7 +5628,7 @@
       </p:sp>
       <p:sp>
         <p:nvSpPr>
-          <p:cNvPr id="451" name="Google Shape;451;g51bd0dfde3_0_18:notes"/>
+          <p:cNvPr id="453" name="Google Shape;453;g51bd0dfde3_0_18:notes"/>
           <p:cNvSpPr txBox="1"/>
           <p:nvPr>
             <p:ph idx="1" type="body"/>
@@ -5679,7 +5678,7 @@
   <p:cSld>
     <p:spTree>
       <p:nvGrpSpPr>
-        <p:cNvPr id="455" name="Shape 455"/>
+        <p:cNvPr id="457" name="Shape 457"/>
         <p:cNvGrpSpPr/>
         <p:nvPr/>
       </p:nvGrpSpPr>
@@ -5693,7 +5692,7 @@
       </p:grpSpPr>
       <p:sp>
         <p:nvSpPr>
-          <p:cNvPr id="456" name="Google Shape;456;g51f3d6bdf7_0_56:notes"/>
+          <p:cNvPr id="458" name="Google Shape;458;g51f3d6bdf7_0_56:notes"/>
           <p:cNvSpPr/>
           <p:nvPr>
             <p:ph idx="2" type="sldImg"/>
@@ -5728,7 +5727,7 @@
       </p:sp>
       <p:sp>
         <p:nvSpPr>
-          <p:cNvPr id="457" name="Google Shape;457;g51f3d6bdf7_0_56:notes"/>
+          <p:cNvPr id="459" name="Google Shape;459;g51f3d6bdf7_0_56:notes"/>
           <p:cNvSpPr txBox="1"/>
           <p:nvPr>
             <p:ph idx="1" type="body"/>
@@ -5778,7 +5777,7 @@
   <p:cSld>
     <p:spTree>
       <p:nvGrpSpPr>
-        <p:cNvPr id="461" name="Shape 461"/>
+        <p:cNvPr id="463" name="Shape 463"/>
         <p:cNvGrpSpPr/>
         <p:nvPr/>
       </p:nvGrpSpPr>
@@ -5792,7 +5791,7 @@
       </p:grpSpPr>
       <p:sp>
         <p:nvSpPr>
-          <p:cNvPr id="462" name="Google Shape;462;g51bd0dfde3_0_23:notes"/>
+          <p:cNvPr id="464" name="Google Shape;464;g51bd0dfde3_0_23:notes"/>
           <p:cNvSpPr/>
           <p:nvPr>
             <p:ph idx="2" type="sldImg"/>
@@ -5827,106 +5826,7 @@
       </p:sp>
       <p:sp>
         <p:nvSpPr>
-          <p:cNvPr id="463" name="Google Shape;463;g51bd0dfde3_0_23:notes"/>
-          <p:cNvSpPr txBox="1"/>
-          <p:nvPr>
-            <p:ph idx="1" type="body"/>
-          </p:nvPr>
-        </p:nvSpPr>
-        <p:spPr>
-          <a:xfrm>
-            <a:off x="685800" y="4343400"/>
-            <a:ext cx="5486400" cy="4114800"/>
-          </a:xfrm>
-          <a:prstGeom prst="rect">
-            <a:avLst/>
-          </a:prstGeom>
-        </p:spPr>
-        <p:txBody>
-          <a:bodyPr anchorCtr="0" anchor="t" bIns="91425" lIns="91425" spcFirstLastPara="1" rIns="91425" wrap="square" tIns="91425">
-            <a:noAutofit/>
-          </a:bodyPr>
-          <a:lstStyle/>
-          <a:p>
-            <a:pPr indent="0" lvl="0" marL="0" rtl="0" algn="l">
-              <a:spcBef>
-                <a:spcPts val="0"/>
-              </a:spcBef>
-              <a:spcAft>
-                <a:spcPts val="0"/>
-              </a:spcAft>
-              <a:buNone/>
-            </a:pPr>
-            <a:r>
-              <a:t/>
-            </a:r>
-            <a:endParaRPr/>
-          </a:p>
-        </p:txBody>
-      </p:sp>
-    </p:spTree>
-  </p:cSld>
-  <p:clrMapOvr>
-    <a:masterClrMapping/>
-  </p:clrMapOvr>
-</p:notes>
-</file>
-
-<file path=ppt/notesSlides/notesSlide57.xml><?xml version="1.0" encoding="utf-8"?>
-<p:notes xmlns:a="http://schemas.openxmlformats.org/drawingml/2006/main" xmlns:r="http://schemas.openxmlformats.org/officeDocument/2006/relationships" xmlns:mc="http://schemas.openxmlformats.org/markup-compatibility/2006" xmlns:mv="urn:schemas-microsoft-com:mac:vml" xmlns:p="http://schemas.openxmlformats.org/presentationml/2006/main" xmlns:c="http://schemas.openxmlformats.org/drawingml/2006/chart" xmlns:dgm="http://schemas.openxmlformats.org/drawingml/2006/diagram" xmlns:o="urn:schemas-microsoft-com:office:office" xmlns:v="urn:schemas-microsoft-com:vml" xmlns:pvml="urn:schemas-microsoft-com:office:powerpoint" xmlns:com="http://schemas.openxmlformats.org/drawingml/2006/compatibility" xmlns:p14="http://schemas.microsoft.com/office/powerpoint/2010/main" xmlns:p15="http://schemas.microsoft.com/office/powerpoint/2012/main" showMasterPhAnim="0" showMasterSp="0">
-  <p:cSld>
-    <p:spTree>
-      <p:nvGrpSpPr>
-        <p:cNvPr id="469" name="Shape 469"/>
-        <p:cNvGrpSpPr/>
-        <p:nvPr/>
-      </p:nvGrpSpPr>
-      <p:grpSpPr>
-        <a:xfrm>
-          <a:off x="0" y="0"/>
-          <a:ext cx="0" cy="0"/>
-          <a:chOff x="0" y="0"/>
-          <a:chExt cx="0" cy="0"/>
-        </a:xfrm>
-      </p:grpSpPr>
-      <p:sp>
-        <p:nvSpPr>
-          <p:cNvPr id="470" name="Google Shape;470;g51bd0dfde3_0_30:notes"/>
-          <p:cNvSpPr/>
-          <p:nvPr>
-            <p:ph idx="2" type="sldImg"/>
-          </p:nvPr>
-        </p:nvSpPr>
-        <p:spPr>
-          <a:xfrm>
-            <a:off x="381300" y="685800"/>
-            <a:ext cx="6096000" cy="3429000"/>
-          </a:xfrm>
-          <a:custGeom>
-            <a:rect b="b" l="l" r="r" t="t"/>
-            <a:pathLst>
-              <a:path extrusionOk="0" h="120000" w="120000">
-                <a:moveTo>
-                  <a:pt x="0" y="0"/>
-                </a:moveTo>
-                <a:lnTo>
-                  <a:pt x="120000" y="0"/>
-                </a:lnTo>
-                <a:lnTo>
-                  <a:pt x="120000" y="120000"/>
-                </a:lnTo>
-                <a:lnTo>
-                  <a:pt x="0" y="120000"/>
-                </a:lnTo>
-                <a:close/>
-              </a:path>
-            </a:pathLst>
-          </a:custGeom>
-        </p:spPr>
-      </p:sp>
-      <p:sp>
-        <p:nvSpPr>
-          <p:cNvPr id="471" name="Google Shape;471;g51bd0dfde3_0_30:notes"/>
+          <p:cNvPr id="465" name="Google Shape;465;g51bd0dfde3_0_23:notes"/>
           <p:cNvSpPr txBox="1"/>
           <p:nvPr>
             <p:ph idx="1" type="body"/>
@@ -20334,6 +20234,52 @@
           </a:ln>
         </p:spPr>
       </p:pic>
+      <p:sp>
+        <p:nvSpPr>
+          <p:cNvPr id="373" name="Google Shape;373;p55"/>
+          <p:cNvSpPr txBox="1"/>
+          <p:nvPr/>
+        </p:nvSpPr>
+        <p:spPr>
+          <a:xfrm>
+            <a:off x="2878825" y="4703625"/>
+            <a:ext cx="5953500" cy="351600"/>
+          </a:xfrm>
+          <a:prstGeom prst="rect">
+            <a:avLst/>
+          </a:prstGeom>
+          <a:noFill/>
+          <a:ln>
+            <a:noFill/>
+          </a:ln>
+        </p:spPr>
+        <p:txBody>
+          <a:bodyPr anchorCtr="0" anchor="t" bIns="91425" lIns="91425" spcFirstLastPara="1" rIns="91425" wrap="square" tIns="91425">
+            <a:noAutofit/>
+          </a:bodyPr>
+          <a:lstStyle/>
+          <a:p>
+            <a:pPr indent="0" lvl="0" marL="0" rtl="0" algn="l">
+              <a:spcBef>
+                <a:spcPts val="0"/>
+              </a:spcBef>
+              <a:spcAft>
+                <a:spcPts val="0"/>
+              </a:spcAft>
+              <a:buNone/>
+            </a:pPr>
+            <a:r>
+              <a:rPr b="1" lang="es"/>
+              <a:t>More variables → </a:t>
+            </a:r>
+            <a:r>
+              <a:rPr lang="es"/>
+              <a:t>https://www.mylinuxplace.com/bash-special-variables/</a:t>
+            </a:r>
+            <a:endParaRPr/>
+          </a:p>
+        </p:txBody>
+      </p:sp>
     </p:spTree>
   </p:cSld>
   <p:clrMapOvr>
@@ -20347,7 +20293,7 @@
   <p:cSld>
     <p:spTree>
       <p:nvGrpSpPr>
-        <p:cNvPr id="376" name="Shape 376"/>
+        <p:cNvPr id="377" name="Shape 377"/>
         <p:cNvGrpSpPr/>
         <p:nvPr/>
       </p:nvGrpSpPr>
@@ -20361,7 +20307,7 @@
       </p:grpSpPr>
       <p:sp>
         <p:nvSpPr>
-          <p:cNvPr id="377" name="Google Shape;377;p56"/>
+          <p:cNvPr id="378" name="Google Shape;378;p56"/>
           <p:cNvSpPr txBox="1"/>
           <p:nvPr>
             <p:ph type="title"/>
@@ -20401,7 +20347,7 @@
       </p:sp>
       <p:sp>
         <p:nvSpPr>
-          <p:cNvPr id="378" name="Google Shape;378;p56"/>
+          <p:cNvPr id="379" name="Google Shape;379;p56"/>
           <p:cNvSpPr txBox="1"/>
           <p:nvPr>
             <p:ph idx="1" type="body"/>
@@ -20449,7 +20395,7 @@
       </p:sp>
       <p:sp>
         <p:nvSpPr>
-          <p:cNvPr id="379" name="Google Shape;379;p56"/>
+          <p:cNvPr id="380" name="Google Shape;380;p56"/>
           <p:cNvSpPr txBox="1"/>
           <p:nvPr/>
         </p:nvSpPr>
@@ -20745,7 +20691,7 @@
   <p:cSld>
     <p:spTree>
       <p:nvGrpSpPr>
-        <p:cNvPr id="383" name="Shape 383"/>
+        <p:cNvPr id="384" name="Shape 384"/>
         <p:cNvGrpSpPr/>
         <p:nvPr/>
       </p:nvGrpSpPr>
@@ -20759,7 +20705,7 @@
       </p:grpSpPr>
       <p:sp>
         <p:nvSpPr>
-          <p:cNvPr id="384" name="Google Shape;384;p57"/>
+          <p:cNvPr id="385" name="Google Shape;385;p57"/>
           <p:cNvSpPr txBox="1"/>
           <p:nvPr>
             <p:ph type="title"/>
@@ -20799,7 +20745,7 @@
       </p:sp>
       <p:sp>
         <p:nvSpPr>
-          <p:cNvPr id="385" name="Google Shape;385;p57"/>
+          <p:cNvPr id="386" name="Google Shape;386;p57"/>
           <p:cNvSpPr txBox="1"/>
           <p:nvPr>
             <p:ph idx="1" type="body"/>
@@ -20847,7 +20793,7 @@
       </p:sp>
       <p:sp>
         <p:nvSpPr>
-          <p:cNvPr id="386" name="Google Shape;386;p57"/>
+          <p:cNvPr id="387" name="Google Shape;387;p57"/>
           <p:cNvSpPr txBox="1"/>
           <p:nvPr/>
         </p:nvSpPr>
@@ -21173,6 +21119,60 @@
                 <a:schemeClr val="dk2"/>
               </a:solidFill>
             </a:endParaRPr>
+          </a:p>
+        </p:txBody>
+      </p:sp>
+      <p:sp>
+        <p:nvSpPr>
+          <p:cNvPr id="388" name="Google Shape;388;p57"/>
+          <p:cNvSpPr txBox="1"/>
+          <p:nvPr/>
+        </p:nvSpPr>
+        <p:spPr>
+          <a:xfrm>
+            <a:off x="1539600" y="4734075"/>
+            <a:ext cx="7292700" cy="326100"/>
+          </a:xfrm>
+          <a:prstGeom prst="rect">
+            <a:avLst/>
+          </a:prstGeom>
+          <a:noFill/>
+          <a:ln>
+            <a:noFill/>
+          </a:ln>
+        </p:spPr>
+        <p:txBody>
+          <a:bodyPr anchorCtr="0" anchor="t" bIns="91425" lIns="91425" spcFirstLastPara="1" rIns="91425" wrap="square" tIns="91425">
+            <a:noAutofit/>
+          </a:bodyPr>
+          <a:lstStyle/>
+          <a:p>
+            <a:pPr indent="0" lvl="0" marL="0" rtl="0" algn="l">
+              <a:spcBef>
+                <a:spcPts val="0"/>
+              </a:spcBef>
+              <a:spcAft>
+                <a:spcPts val="0"/>
+              </a:spcAft>
+              <a:buNone/>
+            </a:pPr>
+            <a:r>
+              <a:rPr b="1" lang="es"/>
+              <a:t>More examples</a:t>
+            </a:r>
+            <a:r>
+              <a:rPr lang="es"/>
+              <a:t> → </a:t>
+            </a:r>
+            <a:r>
+              <a:rPr lang="es"/>
+              <a:t>h</a:t>
+            </a:r>
+            <a:r>
+              <a:rPr lang="es"/>
+              <a:t>ttps://ryanstutorials.net/bash-scripting-tutorial/bash-if-statements.php</a:t>
+            </a:r>
+            <a:endParaRPr/>
           </a:p>
         </p:txBody>
       </p:sp>
@@ -21189,7 +21189,7 @@
   <p:cSld>
     <p:spTree>
       <p:nvGrpSpPr>
-        <p:cNvPr id="390" name="Shape 390"/>
+        <p:cNvPr id="392" name="Shape 392"/>
         <p:cNvGrpSpPr/>
         <p:nvPr/>
       </p:nvGrpSpPr>
@@ -21203,7 +21203,7 @@
       </p:grpSpPr>
       <p:sp>
         <p:nvSpPr>
-          <p:cNvPr id="391" name="Google Shape;391;p58"/>
+          <p:cNvPr id="393" name="Google Shape;393;p58"/>
           <p:cNvSpPr txBox="1"/>
           <p:nvPr>
             <p:ph type="title"/>
@@ -21243,7 +21243,7 @@
       </p:sp>
       <p:sp>
         <p:nvSpPr>
-          <p:cNvPr id="392" name="Google Shape;392;p58"/>
+          <p:cNvPr id="394" name="Google Shape;394;p58"/>
           <p:cNvSpPr txBox="1"/>
           <p:nvPr>
             <p:ph idx="1" type="body"/>
@@ -21291,7 +21291,7 @@
       </p:sp>
       <p:sp>
         <p:nvSpPr>
-          <p:cNvPr id="393" name="Google Shape;393;p58"/>
+          <p:cNvPr id="395" name="Google Shape;395;p58"/>
           <p:cNvSpPr txBox="1"/>
           <p:nvPr/>
         </p:nvSpPr>
@@ -21523,7 +21523,7 @@
   <p:cSld>
     <p:spTree>
       <p:nvGrpSpPr>
-        <p:cNvPr id="397" name="Shape 397"/>
+        <p:cNvPr id="399" name="Shape 399"/>
         <p:cNvGrpSpPr/>
         <p:nvPr/>
       </p:nvGrpSpPr>
@@ -21537,7 +21537,7 @@
       </p:grpSpPr>
       <p:sp>
         <p:nvSpPr>
-          <p:cNvPr id="398" name="Google Shape;398;p59"/>
+          <p:cNvPr id="400" name="Google Shape;400;p59"/>
           <p:cNvSpPr txBox="1"/>
           <p:nvPr>
             <p:ph type="title"/>
@@ -21577,7 +21577,7 @@
       </p:sp>
       <p:sp>
         <p:nvSpPr>
-          <p:cNvPr id="399" name="Google Shape;399;p59"/>
+          <p:cNvPr id="401" name="Google Shape;401;p59"/>
           <p:cNvSpPr txBox="1"/>
           <p:nvPr>
             <p:ph idx="1" type="body"/>
@@ -21625,7 +21625,7 @@
       </p:sp>
       <p:sp>
         <p:nvSpPr>
-          <p:cNvPr id="400" name="Google Shape;400;p59"/>
+          <p:cNvPr id="402" name="Google Shape;402;p59"/>
           <p:cNvSpPr txBox="1"/>
           <p:nvPr/>
         </p:nvSpPr>
@@ -21980,7 +21980,7 @@
       </p:sp>
       <p:sp>
         <p:nvSpPr>
-          <p:cNvPr id="401" name="Google Shape;401;p59"/>
+          <p:cNvPr id="403" name="Google Shape;403;p59"/>
           <p:cNvSpPr txBox="1"/>
           <p:nvPr/>
         </p:nvSpPr>
@@ -22037,7 +22037,7 @@
   <p:cSld>
     <p:spTree>
       <p:nvGrpSpPr>
-        <p:cNvPr id="405" name="Shape 405"/>
+        <p:cNvPr id="407" name="Shape 407"/>
         <p:cNvGrpSpPr/>
         <p:nvPr/>
       </p:nvGrpSpPr>
@@ -22051,7 +22051,7 @@
       </p:grpSpPr>
       <p:sp>
         <p:nvSpPr>
-          <p:cNvPr id="406" name="Google Shape;406;p60"/>
+          <p:cNvPr id="408" name="Google Shape;408;p60"/>
           <p:cNvSpPr txBox="1"/>
           <p:nvPr>
             <p:ph type="title"/>
@@ -22091,7 +22091,7 @@
       </p:sp>
       <p:pic>
         <p:nvPicPr>
-          <p:cNvPr id="407" name="Google Shape;407;p60"/>
+          <p:cNvPr id="409" name="Google Shape;409;p60"/>
           <p:cNvPicPr preferRelativeResize="0"/>
           <p:nvPr/>
         </p:nvPicPr>
@@ -22129,7 +22129,7 @@
   <p:cSld>
     <p:spTree>
       <p:nvGrpSpPr>
-        <p:cNvPr id="411" name="Shape 411"/>
+        <p:cNvPr id="413" name="Shape 413"/>
         <p:cNvGrpSpPr/>
         <p:nvPr/>
       </p:nvGrpSpPr>
@@ -22143,7 +22143,7 @@
       </p:grpSpPr>
       <p:sp>
         <p:nvSpPr>
-          <p:cNvPr id="412" name="Google Shape;412;p61"/>
+          <p:cNvPr id="414" name="Google Shape;414;p61"/>
           <p:cNvSpPr txBox="1"/>
           <p:nvPr>
             <p:ph type="title"/>
@@ -22183,7 +22183,7 @@
       </p:sp>
       <p:pic>
         <p:nvPicPr>
-          <p:cNvPr id="413" name="Google Shape;413;p61"/>
+          <p:cNvPr id="415" name="Google Shape;415;p61"/>
           <p:cNvPicPr preferRelativeResize="0"/>
           <p:nvPr/>
         </p:nvPicPr>
@@ -22353,7 +22353,7 @@
   <p:cSld>
     <p:spTree>
       <p:nvGrpSpPr>
-        <p:cNvPr id="417" name="Shape 417"/>
+        <p:cNvPr id="419" name="Shape 419"/>
         <p:cNvGrpSpPr/>
         <p:nvPr/>
       </p:nvGrpSpPr>
@@ -22367,7 +22367,7 @@
       </p:grpSpPr>
       <p:sp>
         <p:nvSpPr>
-          <p:cNvPr id="418" name="Google Shape;418;p62"/>
+          <p:cNvPr id="420" name="Google Shape;420;p62"/>
           <p:cNvSpPr txBox="1"/>
           <p:nvPr>
             <p:ph type="title"/>
@@ -22405,62 +22405,6 @@
           </a:p>
         </p:txBody>
       </p:sp>
-      <p:pic>
-        <p:nvPicPr>
-          <p:cNvPr id="419" name="Google Shape;419;p62"/>
-          <p:cNvPicPr preferRelativeResize="0"/>
-          <p:nvPr/>
-        </p:nvPicPr>
-        <p:blipFill>
-          <a:blip r:embed="rId3">
-            <a:alphaModFix/>
-          </a:blip>
-          <a:stretch>
-            <a:fillRect/>
-          </a:stretch>
-        </p:blipFill>
-        <p:spPr>
-          <a:xfrm>
-            <a:off x="3469425" y="1164325"/>
-            <a:ext cx="2205151" cy="1594025"/>
-          </a:xfrm>
-          <a:prstGeom prst="rect">
-            <a:avLst/>
-          </a:prstGeom>
-          <a:noFill/>
-          <a:ln>
-            <a:noFill/>
-          </a:ln>
-        </p:spPr>
-      </p:pic>
-      <p:pic>
-        <p:nvPicPr>
-          <p:cNvPr id="420" name="Google Shape;420;p62"/>
-          <p:cNvPicPr preferRelativeResize="0"/>
-          <p:nvPr/>
-        </p:nvPicPr>
-        <p:blipFill>
-          <a:blip r:embed="rId3">
-            <a:alphaModFix/>
-          </a:blip>
-          <a:stretch>
-            <a:fillRect/>
-          </a:stretch>
-        </p:blipFill>
-        <p:spPr>
-          <a:xfrm>
-            <a:off x="6493425" y="1310025"/>
-            <a:ext cx="2205151" cy="1594025"/>
-          </a:xfrm>
-          <a:prstGeom prst="rect">
-            <a:avLst/>
-          </a:prstGeom>
-          <a:noFill/>
-          <a:ln>
-            <a:noFill/>
-          </a:ln>
-        </p:spPr>
-      </p:pic>
       <p:pic>
         <p:nvPicPr>
           <p:cNvPr id="421" name="Google Shape;421;p62"/>
@@ -22477,7 +22421,7 @@
         </p:blipFill>
         <p:spPr>
           <a:xfrm>
-            <a:off x="464100" y="3241200"/>
+            <a:off x="3469425" y="1164325"/>
             <a:ext cx="2205151" cy="1594025"/>
           </a:xfrm>
           <a:prstGeom prst="rect">
@@ -22505,7 +22449,7 @@
         </p:blipFill>
         <p:spPr>
           <a:xfrm>
-            <a:off x="3443025" y="3196350"/>
+            <a:off x="6493425" y="1310025"/>
             <a:ext cx="2205151" cy="1594025"/>
           </a:xfrm>
           <a:prstGeom prst="rect">
@@ -22533,7 +22477,7 @@
         </p:blipFill>
         <p:spPr>
           <a:xfrm>
-            <a:off x="6493425" y="3196350"/>
+            <a:off x="464100" y="3241200"/>
             <a:ext cx="2205151" cy="1594025"/>
           </a:xfrm>
           <a:prstGeom prst="rect">
@@ -22561,7 +22505,7 @@
         </p:blipFill>
         <p:spPr>
           <a:xfrm>
-            <a:off x="311700" y="1190600"/>
+            <a:off x="3443025" y="3196350"/>
             <a:ext cx="2205151" cy="1594025"/>
           </a:xfrm>
           <a:prstGeom prst="rect">
@@ -22573,12 +22517,68 @@
           </a:ln>
         </p:spPr>
       </p:pic>
+      <p:pic>
+        <p:nvPicPr>
+          <p:cNvPr id="425" name="Google Shape;425;p62"/>
+          <p:cNvPicPr preferRelativeResize="0"/>
+          <p:nvPr/>
+        </p:nvPicPr>
+        <p:blipFill>
+          <a:blip r:embed="rId3">
+            <a:alphaModFix/>
+          </a:blip>
+          <a:stretch>
+            <a:fillRect/>
+          </a:stretch>
+        </p:blipFill>
+        <p:spPr>
+          <a:xfrm>
+            <a:off x="6493425" y="3196350"/>
+            <a:ext cx="2205151" cy="1594025"/>
+          </a:xfrm>
+          <a:prstGeom prst="rect">
+            <a:avLst/>
+          </a:prstGeom>
+          <a:noFill/>
+          <a:ln>
+            <a:noFill/>
+          </a:ln>
+        </p:spPr>
+      </p:pic>
+      <p:pic>
+        <p:nvPicPr>
+          <p:cNvPr id="426" name="Google Shape;426;p62"/>
+          <p:cNvPicPr preferRelativeResize="0"/>
+          <p:nvPr/>
+        </p:nvPicPr>
+        <p:blipFill>
+          <a:blip r:embed="rId3">
+            <a:alphaModFix/>
+          </a:blip>
+          <a:stretch>
+            <a:fillRect/>
+          </a:stretch>
+        </p:blipFill>
+        <p:spPr>
+          <a:xfrm>
+            <a:off x="311700" y="1190600"/>
+            <a:ext cx="2205151" cy="1594025"/>
+          </a:xfrm>
+          <a:prstGeom prst="rect">
+            <a:avLst/>
+          </a:prstGeom>
+          <a:noFill/>
+          <a:ln>
+            <a:noFill/>
+          </a:ln>
+        </p:spPr>
+      </p:pic>
       <p:cxnSp>
         <p:nvCxnSpPr>
-          <p:cNvPr id="425" name="Google Shape;425;p62"/>
+          <p:cNvPr id="427" name="Google Shape;427;p62"/>
           <p:cNvCxnSpPr>
-            <a:stCxn id="424" idx="3"/>
-            <a:endCxn id="419" idx="1"/>
+            <a:stCxn id="426" idx="3"/>
+            <a:endCxn id="421" idx="1"/>
           </p:cNvCxnSpPr>
           <p:nvPr/>
         </p:nvCxnSpPr>
@@ -22604,9 +22604,9 @@
       </p:cxnSp>
       <p:cxnSp>
         <p:nvCxnSpPr>
-          <p:cNvPr id="426" name="Google Shape;426;p62"/>
+          <p:cNvPr id="428" name="Google Shape;428;p62"/>
           <p:cNvCxnSpPr>
-            <a:endCxn id="420" idx="1"/>
+            <a:endCxn id="422" idx="1"/>
           </p:cNvCxnSpPr>
           <p:nvPr/>
         </p:nvCxnSpPr>
@@ -22632,10 +22632,10 @@
       </p:cxnSp>
       <p:cxnSp>
         <p:nvCxnSpPr>
-          <p:cNvPr id="427" name="Google Shape;427;p62"/>
+          <p:cNvPr id="429" name="Google Shape;429;p62"/>
           <p:cNvCxnSpPr>
-            <a:stCxn id="423" idx="0"/>
-            <a:endCxn id="420" idx="2"/>
+            <a:stCxn id="425" idx="0"/>
+            <a:endCxn id="422" idx="2"/>
           </p:cNvCxnSpPr>
           <p:nvPr/>
         </p:nvCxnSpPr>
@@ -22661,10 +22661,10 @@
       </p:cxnSp>
       <p:cxnSp>
         <p:nvCxnSpPr>
-          <p:cNvPr id="428" name="Google Shape;428;p62"/>
+          <p:cNvPr id="430" name="Google Shape;430;p62"/>
           <p:cNvCxnSpPr>
-            <a:stCxn id="422" idx="3"/>
-            <a:endCxn id="423" idx="1"/>
+            <a:stCxn id="424" idx="3"/>
+            <a:endCxn id="425" idx="1"/>
           </p:cNvCxnSpPr>
           <p:nvPr/>
         </p:nvCxnSpPr>
@@ -22690,9 +22690,9 @@
       </p:cxnSp>
       <p:cxnSp>
         <p:nvCxnSpPr>
-          <p:cNvPr id="429" name="Google Shape;429;p62"/>
+          <p:cNvPr id="431" name="Google Shape;431;p62"/>
           <p:cNvCxnSpPr>
-            <a:endCxn id="421" idx="3"/>
+            <a:endCxn id="423" idx="3"/>
           </p:cNvCxnSpPr>
           <p:nvPr/>
         </p:nvCxnSpPr>
@@ -22718,10 +22718,10 @@
       </p:cxnSp>
       <p:cxnSp>
         <p:nvCxnSpPr>
-          <p:cNvPr id="430" name="Google Shape;430;p62"/>
+          <p:cNvPr id="432" name="Google Shape;432;p62"/>
           <p:cNvCxnSpPr>
-            <a:stCxn id="421" idx="0"/>
-            <a:endCxn id="424" idx="2"/>
+            <a:stCxn id="423" idx="0"/>
+            <a:endCxn id="426" idx="2"/>
           </p:cNvCxnSpPr>
           <p:nvPr/>
         </p:nvCxnSpPr>
@@ -22758,7 +22758,7 @@
   <p:cSld>
     <p:spTree>
       <p:nvGrpSpPr>
-        <p:cNvPr id="434" name="Shape 434"/>
+        <p:cNvPr id="436" name="Shape 436"/>
         <p:cNvGrpSpPr/>
         <p:nvPr/>
       </p:nvGrpSpPr>
@@ -22772,7 +22772,7 @@
       </p:grpSpPr>
       <p:sp>
         <p:nvSpPr>
-          <p:cNvPr id="435" name="Google Shape;435;p63"/>
+          <p:cNvPr id="437" name="Google Shape;437;p63"/>
           <p:cNvSpPr txBox="1"/>
           <p:nvPr>
             <p:ph type="title"/>
@@ -22812,7 +22812,7 @@
       </p:sp>
       <p:sp>
         <p:nvSpPr>
-          <p:cNvPr id="436" name="Google Shape;436;p63"/>
+          <p:cNvPr id="438" name="Google Shape;438;p63"/>
           <p:cNvSpPr txBox="1"/>
           <p:nvPr>
             <p:ph idx="1" type="body"/>
@@ -22955,7 +22955,7 @@
   <p:cSld>
     <p:spTree>
       <p:nvGrpSpPr>
-        <p:cNvPr id="440" name="Shape 440"/>
+        <p:cNvPr id="442" name="Shape 442"/>
         <p:cNvGrpSpPr/>
         <p:nvPr/>
       </p:nvGrpSpPr>
@@ -22969,7 +22969,7 @@
       </p:grpSpPr>
       <p:sp>
         <p:nvSpPr>
-          <p:cNvPr id="441" name="Google Shape;441;p64"/>
+          <p:cNvPr id="443" name="Google Shape;443;p64"/>
           <p:cNvSpPr txBox="1"/>
           <p:nvPr>
             <p:ph type="title"/>
@@ -23009,7 +23009,7 @@
       </p:sp>
       <p:sp>
         <p:nvSpPr>
-          <p:cNvPr id="442" name="Google Shape;442;p64"/>
+          <p:cNvPr id="444" name="Google Shape;444;p64"/>
           <p:cNvSpPr txBox="1"/>
           <p:nvPr>
             <p:ph idx="1" type="body"/>
@@ -23140,7 +23140,7 @@
   <p:cSld>
     <p:spTree>
       <p:nvGrpSpPr>
-        <p:cNvPr id="446" name="Shape 446"/>
+        <p:cNvPr id="448" name="Shape 448"/>
         <p:cNvGrpSpPr/>
         <p:nvPr/>
       </p:nvGrpSpPr>
@@ -23154,7 +23154,7 @@
       </p:grpSpPr>
       <p:sp>
         <p:nvSpPr>
-          <p:cNvPr id="447" name="Google Shape;447;p65"/>
+          <p:cNvPr id="449" name="Google Shape;449;p65"/>
           <p:cNvSpPr txBox="1"/>
           <p:nvPr>
             <p:ph type="title"/>
@@ -23194,7 +23194,7 @@
       </p:sp>
       <p:sp>
         <p:nvSpPr>
-          <p:cNvPr id="448" name="Google Shape;448;p65"/>
+          <p:cNvPr id="450" name="Google Shape;450;p65"/>
           <p:cNvSpPr txBox="1"/>
           <p:nvPr>
             <p:ph idx="1" type="body"/>
@@ -23357,7 +23357,7 @@
   <p:cSld>
     <p:spTree>
       <p:nvGrpSpPr>
-        <p:cNvPr id="452" name="Shape 452"/>
+        <p:cNvPr id="454" name="Shape 454"/>
         <p:cNvGrpSpPr/>
         <p:nvPr/>
       </p:nvGrpSpPr>
@@ -23371,7 +23371,7 @@
       </p:grpSpPr>
       <p:sp>
         <p:nvSpPr>
-          <p:cNvPr id="453" name="Google Shape;453;p66"/>
+          <p:cNvPr id="455" name="Google Shape;455;p66"/>
           <p:cNvSpPr txBox="1"/>
           <p:nvPr>
             <p:ph type="title"/>
@@ -23415,7 +23415,7 @@
       </p:sp>
       <p:sp>
         <p:nvSpPr>
-          <p:cNvPr id="454" name="Google Shape;454;p66"/>
+          <p:cNvPr id="456" name="Google Shape;456;p66"/>
           <p:cNvSpPr txBox="1"/>
           <p:nvPr>
             <p:ph idx="1" type="body"/>
@@ -23609,7 +23609,7 @@
   <p:cSld>
     <p:spTree>
       <p:nvGrpSpPr>
-        <p:cNvPr id="458" name="Shape 458"/>
+        <p:cNvPr id="460" name="Shape 460"/>
         <p:cNvGrpSpPr/>
         <p:nvPr/>
       </p:nvGrpSpPr>
@@ -23623,7 +23623,7 @@
       </p:grpSpPr>
       <p:sp>
         <p:nvSpPr>
-          <p:cNvPr id="459" name="Google Shape;459;p67"/>
+          <p:cNvPr id="461" name="Google Shape;461;p67"/>
           <p:cNvSpPr txBox="1"/>
           <p:nvPr>
             <p:ph type="title"/>
@@ -23663,7 +23663,7 @@
       </p:sp>
       <p:sp>
         <p:nvSpPr>
-          <p:cNvPr id="460" name="Google Shape;460;p67"/>
+          <p:cNvPr id="462" name="Google Shape;462;p67"/>
           <p:cNvSpPr txBox="1"/>
           <p:nvPr>
             <p:ph idx="1" type="body"/>
@@ -23689,7 +23689,7 @@
                 <a:spcPts val="0"/>
               </a:spcBef>
               <a:spcAft>
-                <a:spcPts val="1600"/>
+                <a:spcPts val="0"/>
               </a:spcAft>
               <a:buClr>
                 <a:schemeClr val="dk1"/>
@@ -23705,6 +23705,151 @@
                 </a:solidFill>
               </a:rPr>
               <a:t>Print differences between file1.tsv and file2.tsv</a:t>
+            </a:r>
+            <a:endParaRPr>
+              <a:solidFill>
+                <a:srgbClr val="000000"/>
+              </a:solidFill>
+            </a:endParaRPr>
+          </a:p>
+          <a:p>
+            <a:pPr indent="0" lvl="0" marL="0" rtl="0" algn="l">
+              <a:spcBef>
+                <a:spcPts val="1600"/>
+              </a:spcBef>
+              <a:spcAft>
+                <a:spcPts val="0"/>
+              </a:spcAft>
+              <a:buClr>
+                <a:schemeClr val="dk1"/>
+              </a:buClr>
+              <a:buSzPts val="1100"/>
+              <a:buFont typeface="Arial"/>
+              <a:buNone/>
+            </a:pPr>
+            <a:r>
+              <a:rPr lang="es">
+                <a:solidFill>
+                  <a:srgbClr val="000000"/>
+                </a:solidFill>
+              </a:rPr>
+              <a:t>How many genes are in file1.tsv? and in file2.tsv?</a:t>
+            </a:r>
+            <a:endParaRPr>
+              <a:solidFill>
+                <a:srgbClr val="000000"/>
+              </a:solidFill>
+            </a:endParaRPr>
+          </a:p>
+          <a:p>
+            <a:pPr indent="0" lvl="0" marL="0" rtl="0" algn="l">
+              <a:spcBef>
+                <a:spcPts val="1600"/>
+              </a:spcBef>
+              <a:spcAft>
+                <a:spcPts val="0"/>
+              </a:spcAft>
+              <a:buClr>
+                <a:schemeClr val="dk1"/>
+              </a:buClr>
+              <a:buSzPts val="1100"/>
+              <a:buFont typeface="Arial"/>
+              <a:buNone/>
+            </a:pPr>
+            <a:r>
+              <a:rPr lang="es">
+                <a:solidFill>
+                  <a:srgbClr val="000000"/>
+                </a:solidFill>
+              </a:rPr>
+              <a:t>Which file has more regions: file1.tsv or file2.tsv?</a:t>
+            </a:r>
+            <a:endParaRPr>
+              <a:solidFill>
+                <a:srgbClr val="000000"/>
+              </a:solidFill>
+            </a:endParaRPr>
+          </a:p>
+          <a:p>
+            <a:pPr indent="0" lvl="0" marL="0" rtl="0" algn="l">
+              <a:spcBef>
+                <a:spcPts val="1600"/>
+              </a:spcBef>
+              <a:spcAft>
+                <a:spcPts val="0"/>
+              </a:spcAft>
+              <a:buClr>
+                <a:schemeClr val="dk1"/>
+              </a:buClr>
+              <a:buSzPts val="1100"/>
+              <a:buFont typeface="Arial"/>
+              <a:buNone/>
+            </a:pPr>
+            <a:r>
+              <a:rPr lang="es">
+                <a:solidFill>
+                  <a:srgbClr val="000000"/>
+                </a:solidFill>
+              </a:rPr>
+              <a:t>Which file is bigger (occupies more bytes): file1.tsv or file2.tsv?</a:t>
+            </a:r>
+            <a:endParaRPr>
+              <a:solidFill>
+                <a:srgbClr val="000000"/>
+              </a:solidFill>
+            </a:endParaRPr>
+          </a:p>
+          <a:p>
+            <a:pPr indent="0" lvl="0" marL="0" rtl="0" algn="l">
+              <a:spcBef>
+                <a:spcPts val="1600"/>
+              </a:spcBef>
+              <a:spcAft>
+                <a:spcPts val="0"/>
+              </a:spcAft>
+              <a:buClr>
+                <a:schemeClr val="dk1"/>
+              </a:buClr>
+              <a:buSzPts val="1100"/>
+              <a:buFont typeface="Arial"/>
+              <a:buNone/>
+            </a:pPr>
+            <a:r>
+              <a:rPr lang="es">
+                <a:solidFill>
+                  <a:srgbClr val="000000"/>
+                </a:solidFill>
+              </a:rPr>
+              <a:t>Find regions regions in common in both files</a:t>
+            </a:r>
+            <a:endParaRPr>
+              <a:solidFill>
+                <a:srgbClr val="000000"/>
+              </a:solidFill>
+            </a:endParaRPr>
+          </a:p>
+          <a:p>
+            <a:pPr indent="0" lvl="0" marL="0" rtl="0" algn="l">
+              <a:spcBef>
+                <a:spcPts val="1600"/>
+              </a:spcBef>
+              <a:spcAft>
+                <a:spcPts val="1600"/>
+              </a:spcAft>
+              <a:buClr>
+                <a:schemeClr val="dk1"/>
+              </a:buClr>
+              <a:buSzPts val="1100"/>
+              <a:buFont typeface="Arial"/>
+              <a:buNone/>
+            </a:pPr>
+            <a:r>
+              <a:rPr lang="es">
+                <a:solidFill>
+                  <a:srgbClr val="000000"/>
+                </a:solidFill>
+              </a:rPr>
+              <a:t>Find how many times NF1 gene appears in file2.tsv</a:t>
             </a:r>
             <a:endParaRPr>
               <a:solidFill>
@@ -23727,7 +23872,7 @@
   <p:cSld>
     <p:spTree>
       <p:nvGrpSpPr>
-        <p:cNvPr id="464" name="Shape 464"/>
+        <p:cNvPr id="466" name="Shape 466"/>
         <p:cNvGrpSpPr/>
         <p:nvPr/>
       </p:nvGrpSpPr>
@@ -23741,7 +23886,7 @@
       </p:grpSpPr>
       <p:sp>
         <p:nvSpPr>
-          <p:cNvPr id="465" name="Google Shape;465;p68"/>
+          <p:cNvPr id="467" name="Google Shape;467;p68"/>
           <p:cNvSpPr txBox="1"/>
           <p:nvPr>
             <p:ph idx="1" type="body"/>
@@ -23777,7 +23922,7 @@
                   <a:srgbClr val="000000"/>
                 </a:solidFill>
               </a:rPr>
-              <a:t>Print last 10 lines of exercise.tsv, but excluding last one</a:t>
+              <a:t>File2.tsv is unsorted. Sort it by chromosome and chromosomal position</a:t>
             </a:r>
             <a:endParaRPr>
               <a:solidFill>
@@ -23796,7 +23941,12 @@
               <a:buNone/>
             </a:pPr>
             <a:r>
-              <a:t/>
+              <a:rPr lang="es">
+                <a:solidFill>
+                  <a:srgbClr val="000000"/>
+                </a:solidFill>
+              </a:rPr>
+              <a:t>File1 is tab-separated file, but customer says that he/she needs comma-separated file. Can you do it using bash?</a:t>
             </a:r>
             <a:endParaRPr>
               <a:solidFill>
@@ -23810,12 +23960,17 @@
                 <a:spcPts val="1600"/>
               </a:spcBef>
               <a:spcAft>
-                <a:spcPts val="0"/>
-              </a:spcAft>
-              <a:buNone/>
-            </a:pPr>
-            <a:r>
-              <a:t/>
+                <a:spcPts val="1600"/>
+              </a:spcAft>
+              <a:buNone/>
+            </a:pPr>
+            <a:r>
+              <a:rPr lang="es">
+                <a:solidFill>
+                  <a:srgbClr val="000000"/>
+                </a:solidFill>
+              </a:rPr>
+              <a:t>There is a typo in file2.tsv. Are you able to find it? (Trick: use sort + uniq)</a:t>
             </a:r>
             <a:endParaRPr>
               <a:solidFill>
@@ -23823,54 +23978,11 @@
               </a:solidFill>
             </a:endParaRPr>
           </a:p>
-          <a:p>
-            <a:pPr indent="0" lvl="0" marL="0" rtl="0" algn="l">
-              <a:spcBef>
-                <a:spcPts val="1600"/>
-              </a:spcBef>
-              <a:spcAft>
-                <a:spcPts val="0"/>
-              </a:spcAft>
-              <a:buNone/>
-            </a:pPr>
-            <a:r>
-              <a:t/>
-            </a:r>
-            <a:endParaRPr>
-              <a:solidFill>
-                <a:srgbClr val="000000"/>
-              </a:solidFill>
-            </a:endParaRPr>
-          </a:p>
-          <a:p>
-            <a:pPr indent="0" lvl="0" marL="0" rtl="0" algn="l">
-              <a:spcBef>
-                <a:spcPts val="1600"/>
-              </a:spcBef>
-              <a:spcAft>
-                <a:spcPts val="1600"/>
-              </a:spcAft>
-              <a:buNone/>
-            </a:pPr>
-            <a:r>
-              <a:rPr lang="es">
-                <a:solidFill>
-                  <a:srgbClr val="000000"/>
-                </a:solidFill>
-              </a:rPr>
-              <a:t>Print 2nd column of exercise.tsv, sort the output and store it in a new file called exercise2.tsv</a:t>
-            </a:r>
-            <a:endParaRPr>
-              <a:solidFill>
-                <a:srgbClr val="000000"/>
-              </a:solidFill>
-            </a:endParaRPr>
-          </a:p>
         </p:txBody>
       </p:sp>
       <p:sp>
         <p:nvSpPr>
-          <p:cNvPr id="466" name="Google Shape;466;p68"/>
+          <p:cNvPr id="468" name="Google Shape;468;p68"/>
           <p:cNvSpPr txBox="1"/>
           <p:nvPr>
             <p:ph type="title"/>
@@ -23906,284 +24018,12 @@
             </a:r>
             <a:r>
               <a:rPr lang="es"/>
-              <a:t>xercises (1)</a:t>
+              <a:t>xercises (3)</a:t>
             </a:r>
             <a:endParaRPr/>
           </a:p>
         </p:txBody>
       </p:sp>
-      <p:pic>
-        <p:nvPicPr>
-          <p:cNvPr id="467" name="Google Shape;467;p68"/>
-          <p:cNvPicPr preferRelativeResize="0"/>
-          <p:nvPr/>
-        </p:nvPicPr>
-        <p:blipFill>
-          <a:blip r:embed="rId3">
-            <a:alphaModFix/>
-          </a:blip>
-          <a:stretch>
-            <a:fillRect/>
-          </a:stretch>
-        </p:blipFill>
-        <p:spPr>
-          <a:xfrm>
-            <a:off x="2049275" y="1481550"/>
-            <a:ext cx="4751150" cy="1374350"/>
-          </a:xfrm>
-          <a:prstGeom prst="rect">
-            <a:avLst/>
-          </a:prstGeom>
-          <a:noFill/>
-          <a:ln>
-            <a:noFill/>
-          </a:ln>
-        </p:spPr>
-      </p:pic>
-      <p:pic>
-        <p:nvPicPr>
-          <p:cNvPr id="468" name="Google Shape;468;p68"/>
-          <p:cNvPicPr preferRelativeResize="0"/>
-          <p:nvPr/>
-        </p:nvPicPr>
-        <p:blipFill>
-          <a:blip r:embed="rId4">
-            <a:alphaModFix/>
-          </a:blip>
-          <a:stretch>
-            <a:fillRect/>
-          </a:stretch>
-        </p:blipFill>
-        <p:spPr>
-          <a:xfrm>
-            <a:off x="1524000" y="3934425"/>
-            <a:ext cx="6096000" cy="219075"/>
-          </a:xfrm>
-          <a:prstGeom prst="rect">
-            <a:avLst/>
-          </a:prstGeom>
-          <a:noFill/>
-          <a:ln>
-            <a:noFill/>
-          </a:ln>
-        </p:spPr>
-      </p:pic>
-    </p:spTree>
-  </p:cSld>
-  <p:clrMapOvr>
-    <a:masterClrMapping/>
-  </p:clrMapOvr>
-</p:sld>
-</file>
-
-<file path=ppt/slides/slide57.xml><?xml version="1.0" encoding="utf-8"?>
-<p:sld xmlns:a="http://schemas.openxmlformats.org/drawingml/2006/main" xmlns:r="http://schemas.openxmlformats.org/officeDocument/2006/relationships" xmlns:mc="http://schemas.openxmlformats.org/markup-compatibility/2006" xmlns:mv="urn:schemas-microsoft-com:mac:vml" xmlns:p="http://schemas.openxmlformats.org/presentationml/2006/main" xmlns:c="http://schemas.openxmlformats.org/drawingml/2006/chart" xmlns:dgm="http://schemas.openxmlformats.org/drawingml/2006/diagram" xmlns:o="urn:schemas-microsoft-com:office:office" xmlns:v="urn:schemas-microsoft-com:vml" xmlns:pvml="urn:schemas-microsoft-com:office:powerpoint" xmlns:com="http://schemas.openxmlformats.org/drawingml/2006/compatibility" xmlns:p14="http://schemas.microsoft.com/office/powerpoint/2010/main" xmlns:p15="http://schemas.microsoft.com/office/powerpoint/2012/main">
-  <p:cSld>
-    <p:spTree>
-      <p:nvGrpSpPr>
-        <p:cNvPr id="472" name="Shape 472"/>
-        <p:cNvGrpSpPr/>
-        <p:nvPr/>
-      </p:nvGrpSpPr>
-      <p:grpSpPr>
-        <a:xfrm>
-          <a:off x="0" y="0"/>
-          <a:ext cx="0" cy="0"/>
-          <a:chOff x="0" y="0"/>
-          <a:chExt cx="0" cy="0"/>
-        </a:xfrm>
-      </p:grpSpPr>
-      <p:sp>
-        <p:nvSpPr>
-          <p:cNvPr id="473" name="Google Shape;473;p69"/>
-          <p:cNvSpPr txBox="1"/>
-          <p:nvPr>
-            <p:ph type="title"/>
-          </p:nvPr>
-        </p:nvSpPr>
-        <p:spPr>
-          <a:xfrm>
-            <a:off x="311700" y="445025"/>
-            <a:ext cx="8520600" cy="572700"/>
-          </a:xfrm>
-          <a:prstGeom prst="rect">
-            <a:avLst/>
-          </a:prstGeom>
-        </p:spPr>
-        <p:txBody>
-          <a:bodyPr anchorCtr="0" anchor="t" bIns="91425" lIns="91425" spcFirstLastPara="1" rIns="91425" wrap="square" tIns="91425">
-            <a:noAutofit/>
-          </a:bodyPr>
-          <a:lstStyle/>
-          <a:p>
-            <a:pPr indent="0" lvl="0" marL="0" rtl="0" algn="ctr">
-              <a:spcBef>
-                <a:spcPts val="0"/>
-              </a:spcBef>
-              <a:spcAft>
-                <a:spcPts val="0"/>
-              </a:spcAft>
-              <a:buNone/>
-            </a:pPr>
-            <a:r>
-              <a:rPr lang="es"/>
-              <a:t>Additional e</a:t>
-            </a:r>
-            <a:r>
-              <a:rPr lang="es"/>
-              <a:t>xercises (1)</a:t>
-            </a:r>
-            <a:endParaRPr/>
-          </a:p>
-        </p:txBody>
-      </p:sp>
-      <p:sp>
-        <p:nvSpPr>
-          <p:cNvPr id="474" name="Google Shape;474;p69"/>
-          <p:cNvSpPr txBox="1"/>
-          <p:nvPr>
-            <p:ph idx="1" type="body"/>
-          </p:nvPr>
-        </p:nvSpPr>
-        <p:spPr>
-          <a:xfrm>
-            <a:off x="311700" y="1152475"/>
-            <a:ext cx="8520600" cy="3416400"/>
-          </a:xfrm>
-          <a:prstGeom prst="rect">
-            <a:avLst/>
-          </a:prstGeom>
-        </p:spPr>
-        <p:txBody>
-          <a:bodyPr anchorCtr="0" anchor="t" bIns="91425" lIns="91425" spcFirstLastPara="1" rIns="91425" wrap="square" tIns="91425">
-            <a:noAutofit/>
-          </a:bodyPr>
-          <a:lstStyle/>
-          <a:p>
-            <a:pPr indent="0" lvl="0" marL="0" rtl="0" algn="l">
-              <a:spcBef>
-                <a:spcPts val="0"/>
-              </a:spcBef>
-              <a:spcAft>
-                <a:spcPts val="0"/>
-              </a:spcAft>
-              <a:buNone/>
-            </a:pPr>
-            <a:r>
-              <a:rPr lang="es">
-                <a:solidFill>
-                  <a:srgbClr val="000000"/>
-                </a:solidFill>
-              </a:rPr>
-              <a:t>Find the files in course folder that starts with ‘ex’ and has ‘2’ in the name</a:t>
-            </a:r>
-            <a:endParaRPr>
-              <a:solidFill>
-                <a:srgbClr val="000000"/>
-              </a:solidFill>
-            </a:endParaRPr>
-          </a:p>
-          <a:p>
-            <a:pPr indent="0" lvl="0" marL="0" rtl="0" algn="l">
-              <a:spcBef>
-                <a:spcPts val="1600"/>
-              </a:spcBef>
-              <a:spcAft>
-                <a:spcPts val="0"/>
-              </a:spcAft>
-              <a:buNone/>
-            </a:pPr>
-            <a:r>
-              <a:t/>
-            </a:r>
-            <a:endParaRPr>
-              <a:solidFill>
-                <a:srgbClr val="000000"/>
-              </a:solidFill>
-            </a:endParaRPr>
-          </a:p>
-          <a:p>
-            <a:pPr indent="0" lvl="0" marL="0" rtl="0" algn="l">
-              <a:spcBef>
-                <a:spcPts val="1600"/>
-              </a:spcBef>
-              <a:spcAft>
-                <a:spcPts val="1600"/>
-              </a:spcAft>
-              <a:buNone/>
-            </a:pPr>
-            <a:r>
-              <a:rPr lang="es">
-                <a:solidFill>
-                  <a:srgbClr val="000000"/>
-                </a:solidFill>
-              </a:rPr>
-              <a:t>Print 6th column of exercise.tsv, change ‘:’ to ‘,’ and sort the output. Append the output to exercise2.tsv</a:t>
-            </a:r>
-            <a:endParaRPr>
-              <a:solidFill>
-                <a:srgbClr val="000000"/>
-              </a:solidFill>
-            </a:endParaRPr>
-          </a:p>
-        </p:txBody>
-      </p:sp>
-      <p:pic>
-        <p:nvPicPr>
-          <p:cNvPr id="475" name="Google Shape;475;p69"/>
-          <p:cNvPicPr preferRelativeResize="0"/>
-          <p:nvPr/>
-        </p:nvPicPr>
-        <p:blipFill>
-          <a:blip r:embed="rId3">
-            <a:alphaModFix/>
-          </a:blip>
-          <a:stretch>
-            <a:fillRect/>
-          </a:stretch>
-        </p:blipFill>
-        <p:spPr>
-          <a:xfrm>
-            <a:off x="2676525" y="1676100"/>
-            <a:ext cx="3790950" cy="228600"/>
-          </a:xfrm>
-          <a:prstGeom prst="rect">
-            <a:avLst/>
-          </a:prstGeom>
-          <a:noFill/>
-          <a:ln>
-            <a:noFill/>
-          </a:ln>
-        </p:spPr>
-      </p:pic>
-      <p:pic>
-        <p:nvPicPr>
-          <p:cNvPr id="476" name="Google Shape;476;p69"/>
-          <p:cNvPicPr preferRelativeResize="0"/>
-          <p:nvPr/>
-        </p:nvPicPr>
-        <p:blipFill>
-          <a:blip r:embed="rId4">
-            <a:alphaModFix/>
-          </a:blip>
-          <a:stretch>
-            <a:fillRect/>
-          </a:stretch>
-        </p:blipFill>
-        <p:spPr>
-          <a:xfrm>
-            <a:off x="1252538" y="3045150"/>
-            <a:ext cx="6638925" cy="209550"/>
-          </a:xfrm>
-          <a:prstGeom prst="rect">
-            <a:avLst/>
-          </a:prstGeom>
-          <a:noFill/>
-          <a:ln>
-            <a:noFill/>
-          </a:ln>
-        </p:spPr>
-      </p:pic>
     </p:spTree>
   </p:cSld>
   <p:clrMapOvr>
@@ -24781,6 +24621,285 @@
 </file>
 
 <file path=ppt/theme/theme1.xml><?xml version="1.0" encoding="utf-8"?>
+<a:theme xmlns:a="http://schemas.openxmlformats.org/drawingml/2006/main" xmlns:r="http://schemas.openxmlformats.org/officeDocument/2006/relationships">
+  <a:themeElements>
+    <a:clrScheme name="Default">
+      <a:dk1>
+        <a:srgbClr val="000000"/>
+      </a:dk1>
+      <a:lt1>
+        <a:srgbClr val="FFFFFF"/>
+      </a:lt1>
+      <a:dk2>
+        <a:srgbClr val="158158"/>
+      </a:dk2>
+      <a:lt2>
+        <a:srgbClr val="F3F3F3"/>
+      </a:lt2>
+      <a:accent1>
+        <a:srgbClr val="058DC7"/>
+      </a:accent1>
+      <a:accent2>
+        <a:srgbClr val="50B432"/>
+      </a:accent2>
+      <a:accent3>
+        <a:srgbClr val="ED561B"/>
+      </a:accent3>
+      <a:accent4>
+        <a:srgbClr val="EDEF00"/>
+      </a:accent4>
+      <a:accent5>
+        <a:srgbClr val="24CBE5"/>
+      </a:accent5>
+      <a:accent6>
+        <a:srgbClr val="64E572"/>
+      </a:accent6>
+      <a:hlink>
+        <a:srgbClr val="2200CC"/>
+      </a:hlink>
+      <a:folHlink>
+        <a:srgbClr val="551A8B"/>
+      </a:folHlink>
+    </a:clrScheme>
+    <a:fontScheme name="Office">
+      <a:majorFont>
+        <a:latin typeface="Arial"/>
+        <a:ea typeface=""/>
+        <a:cs typeface=""/>
+        <a:font script="Jpan" typeface="ＭＳ Ｐゴシック"/>
+        <a:font script="Hang" typeface="맑은 고딕"/>
+        <a:font script="Hans" typeface="宋体"/>
+        <a:font script="Hant" typeface="新細明體"/>
+        <a:font script="Arab" typeface="Times New Roman"/>
+        <a:font script="Hebr" typeface="Times New Roman"/>
+        <a:font script="Thai" typeface="Angsana New"/>
+        <a:font script="Ethi" typeface="Nyala"/>
+        <a:font script="Beng" typeface="Vrinda"/>
+        <a:font script="Gujr" typeface="Shruti"/>
+        <a:font script="Khmr" typeface="MoolBoran"/>
+        <a:font script="Knda" typeface="Tunga"/>
+        <a:font script="Guru" typeface="Raavi"/>
+        <a:font script="Cans" typeface="Euphemia"/>
+        <a:font script="Cher" typeface="Plantagenet Cherokee"/>
+        <a:font script="Yiii" typeface="Microsoft Yi Baiti"/>
+        <a:font script="Tibt" typeface="Microsoft Himalaya"/>
+        <a:font script="Thaa" typeface="MV Boli"/>
+        <a:font script="Deva" typeface="Mangal"/>
+        <a:font script="Telu" typeface="Gautami"/>
+        <a:font script="Taml" typeface="Latha"/>
+        <a:font script="Syrc" typeface="Estrangelo Edessa"/>
+        <a:font script="Orya" typeface="Kalinga"/>
+        <a:font script="Mlym" typeface="Kartika"/>
+        <a:font script="Laoo" typeface="DokChampa"/>
+        <a:font script="Sinh" typeface="Iskoola Pota"/>
+        <a:font script="Mong" typeface="Mongolian Baiti"/>
+        <a:font script="Viet" typeface="Times New Roman"/>
+        <a:font script="Uigh" typeface="Microsoft Uighur"/>
+        <a:font script="Geor" typeface="Sylfaen"/>
+      </a:majorFont>
+      <a:minorFont>
+        <a:latin typeface="Arial"/>
+        <a:ea typeface=""/>
+        <a:cs typeface=""/>
+        <a:font script="Jpan" typeface="ＭＳ Ｐゴシック"/>
+        <a:font script="Hang" typeface="맑은 고딕"/>
+        <a:font script="Hans" typeface="宋体"/>
+        <a:font script="Hant" typeface="新細明體"/>
+        <a:font script="Arab" typeface="Arial"/>
+        <a:font script="Hebr" typeface="Arial"/>
+        <a:font script="Thai" typeface="Cordia New"/>
+        <a:font script="Ethi" typeface="Nyala"/>
+        <a:font script="Beng" typeface="Vrinda"/>
+        <a:font script="Gujr" typeface="Shruti"/>
+        <a:font script="Khmr" typeface="DaunPenh"/>
+        <a:font script="Knda" typeface="Tunga"/>
+        <a:font script="Guru" typeface="Raavi"/>
+        <a:font script="Cans" typeface="Euphemia"/>
+        <a:font script="Cher" typeface="Plantagenet Cherokee"/>
+        <a:font script="Yiii" typeface="Microsoft Yi Baiti"/>
+        <a:font script="Tibt" typeface="Microsoft Himalaya"/>
+        <a:font script="Thaa" typeface="MV Boli"/>
+        <a:font script="Deva" typeface="Mangal"/>
+        <a:font script="Telu" typeface="Gautami"/>
+        <a:font script="Taml" typeface="Latha"/>
+        <a:font script="Syrc" typeface="Estrangelo Edessa"/>
+        <a:font script="Orya" typeface="Kalinga"/>
+        <a:font script="Mlym" typeface="Kartika"/>
+        <a:font script="Laoo" typeface="DokChampa"/>
+        <a:font script="Sinh" typeface="Iskoola Pota"/>
+        <a:font script="Mong" typeface="Mongolian Baiti"/>
+        <a:font script="Viet" typeface="Arial"/>
+        <a:font script="Uigh" typeface="Microsoft Uighur"/>
+        <a:font script="Geor" typeface="Sylfaen"/>
+      </a:minorFont>
+    </a:fontScheme>
+    <a:fmtScheme name="Office">
+      <a:fillStyleLst>
+        <a:solidFill>
+          <a:schemeClr val="phClr"/>
+        </a:solidFill>
+        <a:gradFill rotWithShape="1">
+          <a:gsLst>
+            <a:gs pos="0">
+              <a:schemeClr val="phClr">
+                <a:tint val="50000"/>
+                <a:satMod val="300000"/>
+              </a:schemeClr>
+            </a:gs>
+            <a:gs pos="35000">
+              <a:schemeClr val="phClr">
+                <a:tint val="37000"/>
+                <a:satMod val="300000"/>
+              </a:schemeClr>
+            </a:gs>
+            <a:gs pos="100000">
+              <a:schemeClr val="phClr">
+                <a:tint val="15000"/>
+                <a:satMod val="350000"/>
+              </a:schemeClr>
+            </a:gs>
+          </a:gsLst>
+          <a:lin ang="16200000" scaled="1"/>
+        </a:gradFill>
+        <a:gradFill rotWithShape="1">
+          <a:gsLst>
+            <a:gs pos="0">
+              <a:schemeClr val="phClr">
+                <a:tint val="100000"/>
+                <a:shade val="100000"/>
+                <a:satMod val="130000"/>
+              </a:schemeClr>
+            </a:gs>
+            <a:gs pos="100000">
+              <a:schemeClr val="phClr">
+                <a:tint val="50000"/>
+                <a:shade val="100000"/>
+                <a:satMod val="350000"/>
+              </a:schemeClr>
+            </a:gs>
+          </a:gsLst>
+          <a:lin ang="16200000" scaled="0"/>
+        </a:gradFill>
+      </a:fillStyleLst>
+      <a:lnStyleLst>
+        <a:ln w="9525" cap="flat" cmpd="sng" algn="ctr">
+          <a:solidFill>
+            <a:schemeClr val="phClr">
+              <a:shade val="95000"/>
+              <a:satMod val="105000"/>
+            </a:schemeClr>
+          </a:solidFill>
+          <a:prstDash val="solid"/>
+        </a:ln>
+        <a:ln w="25400" cap="flat" cmpd="sng" algn="ctr">
+          <a:solidFill>
+            <a:schemeClr val="phClr"/>
+          </a:solidFill>
+          <a:prstDash val="solid"/>
+        </a:ln>
+        <a:ln w="38100" cap="flat" cmpd="sng" algn="ctr">
+          <a:solidFill>
+            <a:schemeClr val="phClr"/>
+          </a:solidFill>
+          <a:prstDash val="solid"/>
+        </a:ln>
+      </a:lnStyleLst>
+      <a:effectStyleLst>
+        <a:effectStyle>
+          <a:effectLst>
+            <a:outerShdw blurRad="40000" dist="20000" dir="5400000" rotWithShape="0">
+              <a:srgbClr val="000000">
+                <a:alpha val="38000"/>
+              </a:srgbClr>
+            </a:outerShdw>
+          </a:effectLst>
+        </a:effectStyle>
+        <a:effectStyle>
+          <a:effectLst>
+            <a:outerShdw blurRad="40000" dist="23000" dir="5400000" rotWithShape="0">
+              <a:srgbClr val="000000">
+                <a:alpha val="35000"/>
+              </a:srgbClr>
+            </a:outerShdw>
+          </a:effectLst>
+        </a:effectStyle>
+        <a:effectStyle>
+          <a:effectLst>
+            <a:outerShdw blurRad="40000" dist="23000" dir="5400000" rotWithShape="0">
+              <a:srgbClr val="000000">
+                <a:alpha val="35000"/>
+              </a:srgbClr>
+            </a:outerShdw>
+          </a:effectLst>
+          <a:scene3d>
+            <a:camera prst="orthographicFront">
+              <a:rot lat="0" lon="0" rev="0"/>
+            </a:camera>
+            <a:lightRig rig="threePt" dir="t">
+              <a:rot lat="0" lon="0" rev="1200000"/>
+            </a:lightRig>
+          </a:scene3d>
+          <a:sp3d>
+            <a:bevelT w="63500" h="25400"/>
+          </a:sp3d>
+        </a:effectStyle>
+      </a:effectStyleLst>
+      <a:bgFillStyleLst>
+        <a:solidFill>
+          <a:schemeClr val="phClr"/>
+        </a:solidFill>
+        <a:gradFill rotWithShape="1">
+          <a:gsLst>
+            <a:gs pos="0">
+              <a:schemeClr val="phClr">
+                <a:tint val="40000"/>
+                <a:satMod val="350000"/>
+              </a:schemeClr>
+            </a:gs>
+            <a:gs pos="40000">
+              <a:schemeClr val="phClr">
+                <a:tint val="45000"/>
+                <a:shade val="99000"/>
+                <a:satMod val="350000"/>
+              </a:schemeClr>
+            </a:gs>
+            <a:gs pos="100000">
+              <a:schemeClr val="phClr">
+                <a:shade val="20000"/>
+                <a:satMod val="255000"/>
+              </a:schemeClr>
+            </a:gs>
+          </a:gsLst>
+          <a:path path="circle">
+            <a:fillToRect l="50000" t="-80000" r="50000" b="180000"/>
+          </a:path>
+        </a:gradFill>
+        <a:gradFill rotWithShape="1">
+          <a:gsLst>
+            <a:gs pos="0">
+              <a:schemeClr val="phClr">
+                <a:tint val="80000"/>
+                <a:satMod val="300000"/>
+              </a:schemeClr>
+            </a:gs>
+            <a:gs pos="100000">
+              <a:schemeClr val="phClr">
+                <a:shade val="30000"/>
+                <a:satMod val="200000"/>
+              </a:schemeClr>
+            </a:gs>
+          </a:gsLst>
+          <a:path path="circle">
+            <a:fillToRect l="50000" t="50000" r="50000" b="50000"/>
+          </a:path>
+        </a:gradFill>
+      </a:bgFillStyleLst>
+    </a:fmtScheme>
+  </a:themeElements>
+</a:theme>
+</file>
+
+<file path=ppt/theme/theme2.xml><?xml version="1.0" encoding="utf-8"?>
 <a:theme xmlns:a="http://schemas.openxmlformats.org/drawingml/2006/main" xmlns:r="http://schemas.openxmlformats.org/officeDocument/2006/relationships" name="Simple Light">
   <a:themeElements>
     <a:clrScheme name="Simple Light">
@@ -25057,283 +25176,4 @@
     </a:fmtScheme>
   </a:themeElements>
 </a:theme>
-</file>
-
-<file path=ppt/theme/theme2.xml><?xml version="1.0" encoding="utf-8"?>
-<a:theme xmlns:a="http://schemas.openxmlformats.org/drawingml/2006/main" xmlns:r="http://schemas.openxmlformats.org/officeDocument/2006/relationships">
-  <a:themeElements>
-    <a:clrScheme name="Default">
-      <a:dk1>
-        <a:srgbClr val="000000"/>
-      </a:dk1>
-      <a:lt1>
-        <a:srgbClr val="FFFFFF"/>
-      </a:lt1>
-      <a:dk2>
-        <a:srgbClr val="158158"/>
-      </a:dk2>
-      <a:lt2>
-        <a:srgbClr val="F3F3F3"/>
-      </a:lt2>
-      <a:accent1>
-        <a:srgbClr val="058DC7"/>
-      </a:accent1>
-      <a:accent2>
-        <a:srgbClr val="50B432"/>
-      </a:accent2>
-      <a:accent3>
-        <a:srgbClr val="ED561B"/>
-      </a:accent3>
-      <a:accent4>
-        <a:srgbClr val="EDEF00"/>
-      </a:accent4>
-      <a:accent5>
-        <a:srgbClr val="24CBE5"/>
-      </a:accent5>
-      <a:accent6>
-        <a:srgbClr val="64E572"/>
-      </a:accent6>
-      <a:hlink>
-        <a:srgbClr val="2200CC"/>
-      </a:hlink>
-      <a:folHlink>
-        <a:srgbClr val="551A8B"/>
-      </a:folHlink>
-    </a:clrScheme>
-    <a:fontScheme name="Office">
-      <a:majorFont>
-        <a:latin typeface="Arial"/>
-        <a:ea typeface=""/>
-        <a:cs typeface=""/>
-        <a:font script="Jpan" typeface="ＭＳ Ｐゴシック"/>
-        <a:font script="Hang" typeface="맑은 고딕"/>
-        <a:font script="Hans" typeface="宋体"/>
-        <a:font script="Hant" typeface="新細明體"/>
-        <a:font script="Arab" typeface="Times New Roman"/>
-        <a:font script="Hebr" typeface="Times New Roman"/>
-        <a:font script="Thai" typeface="Angsana New"/>
-        <a:font script="Ethi" typeface="Nyala"/>
-        <a:font script="Beng" typeface="Vrinda"/>
-        <a:font script="Gujr" typeface="Shruti"/>
-        <a:font script="Khmr" typeface="MoolBoran"/>
-        <a:font script="Knda" typeface="Tunga"/>
-        <a:font script="Guru" typeface="Raavi"/>
-        <a:font script="Cans" typeface="Euphemia"/>
-        <a:font script="Cher" typeface="Plantagenet Cherokee"/>
-        <a:font script="Yiii" typeface="Microsoft Yi Baiti"/>
-        <a:font script="Tibt" typeface="Microsoft Himalaya"/>
-        <a:font script="Thaa" typeface="MV Boli"/>
-        <a:font script="Deva" typeface="Mangal"/>
-        <a:font script="Telu" typeface="Gautami"/>
-        <a:font script="Taml" typeface="Latha"/>
-        <a:font script="Syrc" typeface="Estrangelo Edessa"/>
-        <a:font script="Orya" typeface="Kalinga"/>
-        <a:font script="Mlym" typeface="Kartika"/>
-        <a:font script="Laoo" typeface="DokChampa"/>
-        <a:font script="Sinh" typeface="Iskoola Pota"/>
-        <a:font script="Mong" typeface="Mongolian Baiti"/>
-        <a:font script="Viet" typeface="Times New Roman"/>
-        <a:font script="Uigh" typeface="Microsoft Uighur"/>
-        <a:font script="Geor" typeface="Sylfaen"/>
-      </a:majorFont>
-      <a:minorFont>
-        <a:latin typeface="Arial"/>
-        <a:ea typeface=""/>
-        <a:cs typeface=""/>
-        <a:font script="Jpan" typeface="ＭＳ Ｐゴシック"/>
-        <a:font script="Hang" typeface="맑은 고딕"/>
-        <a:font script="Hans" typeface="宋体"/>
-        <a:font script="Hant" typeface="新細明體"/>
-        <a:font script="Arab" typeface="Arial"/>
-        <a:font script="Hebr" typeface="Arial"/>
-        <a:font script="Thai" typeface="Cordia New"/>
-        <a:font script="Ethi" typeface="Nyala"/>
-        <a:font script="Beng" typeface="Vrinda"/>
-        <a:font script="Gujr" typeface="Shruti"/>
-        <a:font script="Khmr" typeface="DaunPenh"/>
-        <a:font script="Knda" typeface="Tunga"/>
-        <a:font script="Guru" typeface="Raavi"/>
-        <a:font script="Cans" typeface="Euphemia"/>
-        <a:font script="Cher" typeface="Plantagenet Cherokee"/>
-        <a:font script="Yiii" typeface="Microsoft Yi Baiti"/>
-        <a:font script="Tibt" typeface="Microsoft Himalaya"/>
-        <a:font script="Thaa" typeface="MV Boli"/>
-        <a:font script="Deva" typeface="Mangal"/>
-        <a:font script="Telu" typeface="Gautami"/>
-        <a:font script="Taml" typeface="Latha"/>
-        <a:font script="Syrc" typeface="Estrangelo Edessa"/>
-        <a:font script="Orya" typeface="Kalinga"/>
-        <a:font script="Mlym" typeface="Kartika"/>
-        <a:font script="Laoo" typeface="DokChampa"/>
-        <a:font script="Sinh" typeface="Iskoola Pota"/>
-        <a:font script="Mong" typeface="Mongolian Baiti"/>
-        <a:font script="Viet" typeface="Arial"/>
-        <a:font script="Uigh" typeface="Microsoft Uighur"/>
-        <a:font script="Geor" typeface="Sylfaen"/>
-      </a:minorFont>
-    </a:fontScheme>
-    <a:fmtScheme name="Office">
-      <a:fillStyleLst>
-        <a:solidFill>
-          <a:schemeClr val="phClr"/>
-        </a:solidFill>
-        <a:gradFill rotWithShape="1">
-          <a:gsLst>
-            <a:gs pos="0">
-              <a:schemeClr val="phClr">
-                <a:tint val="50000"/>
-                <a:satMod val="300000"/>
-              </a:schemeClr>
-            </a:gs>
-            <a:gs pos="35000">
-              <a:schemeClr val="phClr">
-                <a:tint val="37000"/>
-                <a:satMod val="300000"/>
-              </a:schemeClr>
-            </a:gs>
-            <a:gs pos="100000">
-              <a:schemeClr val="phClr">
-                <a:tint val="15000"/>
-                <a:satMod val="350000"/>
-              </a:schemeClr>
-            </a:gs>
-          </a:gsLst>
-          <a:lin ang="16200000" scaled="1"/>
-        </a:gradFill>
-        <a:gradFill rotWithShape="1">
-          <a:gsLst>
-            <a:gs pos="0">
-              <a:schemeClr val="phClr">
-                <a:tint val="100000"/>
-                <a:shade val="100000"/>
-                <a:satMod val="130000"/>
-              </a:schemeClr>
-            </a:gs>
-            <a:gs pos="100000">
-              <a:schemeClr val="phClr">
-                <a:tint val="50000"/>
-                <a:shade val="100000"/>
-                <a:satMod val="350000"/>
-              </a:schemeClr>
-            </a:gs>
-          </a:gsLst>
-          <a:lin ang="16200000" scaled="0"/>
-        </a:gradFill>
-      </a:fillStyleLst>
-      <a:lnStyleLst>
-        <a:ln w="9525" cap="flat" cmpd="sng" algn="ctr">
-          <a:solidFill>
-            <a:schemeClr val="phClr">
-              <a:shade val="95000"/>
-              <a:satMod val="105000"/>
-            </a:schemeClr>
-          </a:solidFill>
-          <a:prstDash val="solid"/>
-        </a:ln>
-        <a:ln w="25400" cap="flat" cmpd="sng" algn="ctr">
-          <a:solidFill>
-            <a:schemeClr val="phClr"/>
-          </a:solidFill>
-          <a:prstDash val="solid"/>
-        </a:ln>
-        <a:ln w="38100" cap="flat" cmpd="sng" algn="ctr">
-          <a:solidFill>
-            <a:schemeClr val="phClr"/>
-          </a:solidFill>
-          <a:prstDash val="solid"/>
-        </a:ln>
-      </a:lnStyleLst>
-      <a:effectStyleLst>
-        <a:effectStyle>
-          <a:effectLst>
-            <a:outerShdw blurRad="40000" dist="20000" dir="5400000" rotWithShape="0">
-              <a:srgbClr val="000000">
-                <a:alpha val="38000"/>
-              </a:srgbClr>
-            </a:outerShdw>
-          </a:effectLst>
-        </a:effectStyle>
-        <a:effectStyle>
-          <a:effectLst>
-            <a:outerShdw blurRad="40000" dist="23000" dir="5400000" rotWithShape="0">
-              <a:srgbClr val="000000">
-                <a:alpha val="35000"/>
-              </a:srgbClr>
-            </a:outerShdw>
-          </a:effectLst>
-        </a:effectStyle>
-        <a:effectStyle>
-          <a:effectLst>
-            <a:outerShdw blurRad="40000" dist="23000" dir="5400000" rotWithShape="0">
-              <a:srgbClr val="000000">
-                <a:alpha val="35000"/>
-              </a:srgbClr>
-            </a:outerShdw>
-          </a:effectLst>
-          <a:scene3d>
-            <a:camera prst="orthographicFront">
-              <a:rot lat="0" lon="0" rev="0"/>
-            </a:camera>
-            <a:lightRig rig="threePt" dir="t">
-              <a:rot lat="0" lon="0" rev="1200000"/>
-            </a:lightRig>
-          </a:scene3d>
-          <a:sp3d>
-            <a:bevelT w="63500" h="25400"/>
-          </a:sp3d>
-        </a:effectStyle>
-      </a:effectStyleLst>
-      <a:bgFillStyleLst>
-        <a:solidFill>
-          <a:schemeClr val="phClr"/>
-        </a:solidFill>
-        <a:gradFill rotWithShape="1">
-          <a:gsLst>
-            <a:gs pos="0">
-              <a:schemeClr val="phClr">
-                <a:tint val="40000"/>
-                <a:satMod val="350000"/>
-              </a:schemeClr>
-            </a:gs>
-            <a:gs pos="40000">
-              <a:schemeClr val="phClr">
-                <a:tint val="45000"/>
-                <a:shade val="99000"/>
-                <a:satMod val="350000"/>
-              </a:schemeClr>
-            </a:gs>
-            <a:gs pos="100000">
-              <a:schemeClr val="phClr">
-                <a:shade val="20000"/>
-                <a:satMod val="255000"/>
-              </a:schemeClr>
-            </a:gs>
-          </a:gsLst>
-          <a:path path="circle">
-            <a:fillToRect l="50000" t="-80000" r="50000" b="180000"/>
-          </a:path>
-        </a:gradFill>
-        <a:gradFill rotWithShape="1">
-          <a:gsLst>
-            <a:gs pos="0">
-              <a:schemeClr val="phClr">
-                <a:tint val="80000"/>
-                <a:satMod val="300000"/>
-              </a:schemeClr>
-            </a:gs>
-            <a:gs pos="100000">
-              <a:schemeClr val="phClr">
-                <a:shade val="30000"/>
-                <a:satMod val="200000"/>
-              </a:schemeClr>
-            </a:gs>
-          </a:gsLst>
-          <a:path path="circle">
-            <a:fillToRect l="50000" t="50000" r="50000" b="50000"/>
-          </a:path>
-        </a:gradFill>
-      </a:bgFillStyleLst>
-    </a:fmtScheme>
-  </a:themeElements>
-</a:theme>
 </file>
</xml_diff>